<commit_message>
early version of cognito kakao auth(oidc)
</commit_message>
<xml_diff>
--- a/개발계획서.pptx
+++ b/개발계획서.pptx
@@ -4,6 +4,9 @@
   <p:sldMasterIdLst>
     <p:sldMasterId id="2147483648" r:id="rId1"/>
   </p:sldMasterIdLst>
+  <p:notesMasterIdLst>
+    <p:notesMasterId r:id="rId10"/>
+  </p:notesMasterIdLst>
   <p:sldIdLst>
     <p:sldId id="257" r:id="rId2"/>
     <p:sldId id="258" r:id="rId3"/>
@@ -12,6 +15,7 @@
     <p:sldId id="271" r:id="rId6"/>
     <p:sldId id="270" r:id="rId7"/>
     <p:sldId id="269" r:id="rId8"/>
+    <p:sldId id="274" r:id="rId9"/>
   </p:sldIdLst>
   <p:sldSz cx="12192000" cy="6858000"/>
   <p:notesSz cx="6858000" cy="9144000"/>
@@ -118,6 +122,439 @@
 </p:presentation>
 </file>
 
+<file path=ppt/notesMasters/notesMaster1.xml><?xml version="1.0" encoding="utf-8"?>
+<p:notesMaster xmlns:a="http://schemas.openxmlformats.org/drawingml/2006/main" xmlns:r="http://schemas.openxmlformats.org/officeDocument/2006/relationships" xmlns:p="http://schemas.openxmlformats.org/presentationml/2006/main">
+  <p:cSld>
+    <p:bg>
+      <p:bgRef idx="1001">
+        <a:schemeClr val="bg1"/>
+      </p:bgRef>
+    </p:bg>
+    <p:spTree>
+      <p:nvGrpSpPr>
+        <p:cNvPr id="1" name=""/>
+        <p:cNvGrpSpPr/>
+        <p:nvPr/>
+      </p:nvGrpSpPr>
+      <p:grpSpPr>
+        <a:xfrm>
+          <a:off x="0" y="0"/>
+          <a:ext cx="0" cy="0"/>
+          <a:chOff x="0" y="0"/>
+          <a:chExt cx="0" cy="0"/>
+        </a:xfrm>
+      </p:grpSpPr>
+      <p:sp>
+        <p:nvSpPr>
+          <p:cNvPr id="2" name="머리글 개체 틀 1"/>
+          <p:cNvSpPr>
+            <a:spLocks noGrp="1"/>
+          </p:cNvSpPr>
+          <p:nvPr>
+            <p:ph type="hdr" sz="quarter"/>
+          </p:nvPr>
+        </p:nvSpPr>
+        <p:spPr>
+          <a:xfrm>
+            <a:off x="0" y="0"/>
+            <a:ext cx="2971800" cy="458788"/>
+          </a:xfrm>
+          <a:prstGeom prst="rect">
+            <a:avLst/>
+          </a:prstGeom>
+        </p:spPr>
+        <p:txBody>
+          <a:bodyPr vert="horz" lIns="91440" tIns="45720" rIns="91440" bIns="45720" rtlCol="0"/>
+          <a:lstStyle>
+            <a:lvl1pPr algn="l">
+              <a:defRPr sz="1200"/>
+            </a:lvl1pPr>
+          </a:lstStyle>
+          <a:p>
+            <a:endParaRPr kumimoji="1" lang="ko-KR" altLang="en-US"/>
+          </a:p>
+        </p:txBody>
+      </p:sp>
+      <p:sp>
+        <p:nvSpPr>
+          <p:cNvPr id="3" name="날짜 개체 틀 2"/>
+          <p:cNvSpPr>
+            <a:spLocks noGrp="1"/>
+          </p:cNvSpPr>
+          <p:nvPr>
+            <p:ph type="dt" idx="1"/>
+          </p:nvPr>
+        </p:nvSpPr>
+        <p:spPr>
+          <a:xfrm>
+            <a:off x="3884613" y="0"/>
+            <a:ext cx="2971800" cy="458788"/>
+          </a:xfrm>
+          <a:prstGeom prst="rect">
+            <a:avLst/>
+          </a:prstGeom>
+        </p:spPr>
+        <p:txBody>
+          <a:bodyPr vert="horz" lIns="91440" tIns="45720" rIns="91440" bIns="45720" rtlCol="0"/>
+          <a:lstStyle>
+            <a:lvl1pPr algn="r">
+              <a:defRPr sz="1200"/>
+            </a:lvl1pPr>
+          </a:lstStyle>
+          <a:p>
+            <a:fld id="{9458FFD9-5838-1449-9919-C8A4367C6D0D}" type="datetimeFigureOut">
+              <a:rPr kumimoji="1" lang="ko-KR" altLang="en-US" smtClean="0"/>
+              <a:t>2024. 7. 29.</a:t>
+            </a:fld>
+            <a:endParaRPr kumimoji="1" lang="ko-KR" altLang="en-US"/>
+          </a:p>
+        </p:txBody>
+      </p:sp>
+      <p:sp>
+        <p:nvSpPr>
+          <p:cNvPr id="4" name="슬라이드 이미지 개체 틀 3"/>
+          <p:cNvSpPr>
+            <a:spLocks noGrp="1" noRot="1" noChangeAspect="1"/>
+          </p:cNvSpPr>
+          <p:nvPr>
+            <p:ph type="sldImg" idx="2"/>
+          </p:nvPr>
+        </p:nvSpPr>
+        <p:spPr>
+          <a:xfrm>
+            <a:off x="685800" y="1143000"/>
+            <a:ext cx="5486400" cy="3086100"/>
+          </a:xfrm>
+          <a:prstGeom prst="rect">
+            <a:avLst/>
+          </a:prstGeom>
+          <a:noFill/>
+          <a:ln w="12700">
+            <a:solidFill>
+              <a:prstClr val="black"/>
+            </a:solidFill>
+          </a:ln>
+        </p:spPr>
+        <p:txBody>
+          <a:bodyPr vert="horz" lIns="91440" tIns="45720" rIns="91440" bIns="45720" rtlCol="0" anchor="ctr"/>
+          <a:lstStyle/>
+          <a:p>
+            <a:endParaRPr lang="ko-KR" altLang="en-US"/>
+          </a:p>
+        </p:txBody>
+      </p:sp>
+      <p:sp>
+        <p:nvSpPr>
+          <p:cNvPr id="5" name="슬라이드 노트 개체 틀 4"/>
+          <p:cNvSpPr>
+            <a:spLocks noGrp="1"/>
+          </p:cNvSpPr>
+          <p:nvPr>
+            <p:ph type="body" sz="quarter" idx="3"/>
+          </p:nvPr>
+        </p:nvSpPr>
+        <p:spPr>
+          <a:xfrm>
+            <a:off x="685800" y="4400550"/>
+            <a:ext cx="5486400" cy="3600450"/>
+          </a:xfrm>
+          <a:prstGeom prst="rect">
+            <a:avLst/>
+          </a:prstGeom>
+        </p:spPr>
+        <p:txBody>
+          <a:bodyPr vert="horz" lIns="91440" tIns="45720" rIns="91440" bIns="45720" rtlCol="0"/>
+          <a:lstStyle/>
+          <a:p>
+            <a:pPr lvl="0"/>
+            <a:r>
+              <a:rPr kumimoji="1" lang="ko-KR" altLang="en-US"/>
+              <a:t>마스터 텍스트 스타일을 편집하려면 클릭</a:t>
+            </a:r>
+          </a:p>
+          <a:p>
+            <a:pPr lvl="1"/>
+            <a:r>
+              <a:rPr kumimoji="1" lang="ko-KR" altLang="en-US"/>
+              <a:t>두 번째 수준</a:t>
+            </a:r>
+          </a:p>
+          <a:p>
+            <a:pPr lvl="2"/>
+            <a:r>
+              <a:rPr kumimoji="1" lang="ko-KR" altLang="en-US"/>
+              <a:t>세 번째 수준</a:t>
+            </a:r>
+          </a:p>
+          <a:p>
+            <a:pPr lvl="3"/>
+            <a:r>
+              <a:rPr kumimoji="1" lang="ko-KR" altLang="en-US"/>
+              <a:t>네 번째 수준</a:t>
+            </a:r>
+          </a:p>
+          <a:p>
+            <a:pPr lvl="4"/>
+            <a:r>
+              <a:rPr kumimoji="1" lang="ko-KR" altLang="en-US"/>
+              <a:t>다섯 번째 수준</a:t>
+            </a:r>
+          </a:p>
+        </p:txBody>
+      </p:sp>
+      <p:sp>
+        <p:nvSpPr>
+          <p:cNvPr id="6" name="바닥글 개체 틀 5"/>
+          <p:cNvSpPr>
+            <a:spLocks noGrp="1"/>
+          </p:cNvSpPr>
+          <p:nvPr>
+            <p:ph type="ftr" sz="quarter" idx="4"/>
+          </p:nvPr>
+        </p:nvSpPr>
+        <p:spPr>
+          <a:xfrm>
+            <a:off x="0" y="8685213"/>
+            <a:ext cx="2971800" cy="458787"/>
+          </a:xfrm>
+          <a:prstGeom prst="rect">
+            <a:avLst/>
+          </a:prstGeom>
+        </p:spPr>
+        <p:txBody>
+          <a:bodyPr vert="horz" lIns="91440" tIns="45720" rIns="91440" bIns="45720" rtlCol="0" anchor="b"/>
+          <a:lstStyle>
+            <a:lvl1pPr algn="l">
+              <a:defRPr sz="1200"/>
+            </a:lvl1pPr>
+          </a:lstStyle>
+          <a:p>
+            <a:endParaRPr kumimoji="1" lang="ko-KR" altLang="en-US"/>
+          </a:p>
+        </p:txBody>
+      </p:sp>
+      <p:sp>
+        <p:nvSpPr>
+          <p:cNvPr id="7" name="슬라이드 번호 개체 틀 6"/>
+          <p:cNvSpPr>
+            <a:spLocks noGrp="1"/>
+          </p:cNvSpPr>
+          <p:nvPr>
+            <p:ph type="sldNum" sz="quarter" idx="5"/>
+          </p:nvPr>
+        </p:nvSpPr>
+        <p:spPr>
+          <a:xfrm>
+            <a:off x="3884613" y="8685213"/>
+            <a:ext cx="2971800" cy="458787"/>
+          </a:xfrm>
+          <a:prstGeom prst="rect">
+            <a:avLst/>
+          </a:prstGeom>
+        </p:spPr>
+        <p:txBody>
+          <a:bodyPr vert="horz" lIns="91440" tIns="45720" rIns="91440" bIns="45720" rtlCol="0" anchor="b"/>
+          <a:lstStyle>
+            <a:lvl1pPr algn="r">
+              <a:defRPr sz="1200"/>
+            </a:lvl1pPr>
+          </a:lstStyle>
+          <a:p>
+            <a:fld id="{C7D1C44E-14C5-4047-905B-19D9AA244188}" type="slidenum">
+              <a:rPr kumimoji="1" lang="ko-KR" altLang="en-US" smtClean="0"/>
+              <a:t>‹#›</a:t>
+            </a:fld>
+            <a:endParaRPr kumimoji="1" lang="ko-KR" altLang="en-US"/>
+          </a:p>
+        </p:txBody>
+      </p:sp>
+    </p:spTree>
+    <p:extLst>
+      <p:ext uri="{BB962C8B-B14F-4D97-AF65-F5344CB8AC3E}">
+        <p14:creationId xmlns:p14="http://schemas.microsoft.com/office/powerpoint/2010/main" val="3116812496"/>
+      </p:ext>
+    </p:extLst>
+  </p:cSld>
+  <p:clrMap bg1="lt1" tx1="dk1" bg2="lt2" tx2="dk2" accent1="accent1" accent2="accent2" accent3="accent3" accent4="accent4" accent5="accent5" accent6="accent6" hlink="hlink" folHlink="folHlink"/>
+  <p:notesStyle>
+    <a:lvl1pPr marL="0" algn="l" defTabSz="914400" rtl="0" eaLnBrk="1" latinLnBrk="1" hangingPunct="1">
+      <a:defRPr sz="1200" kern="1200">
+        <a:solidFill>
+          <a:schemeClr val="tx1"/>
+        </a:solidFill>
+        <a:latin typeface="+mn-lt"/>
+        <a:ea typeface="+mn-ea"/>
+        <a:cs typeface="+mn-cs"/>
+      </a:defRPr>
+    </a:lvl1pPr>
+    <a:lvl2pPr marL="457200" algn="l" defTabSz="914400" rtl="0" eaLnBrk="1" latinLnBrk="1" hangingPunct="1">
+      <a:defRPr sz="1200" kern="1200">
+        <a:solidFill>
+          <a:schemeClr val="tx1"/>
+        </a:solidFill>
+        <a:latin typeface="+mn-lt"/>
+        <a:ea typeface="+mn-ea"/>
+        <a:cs typeface="+mn-cs"/>
+      </a:defRPr>
+    </a:lvl2pPr>
+    <a:lvl3pPr marL="914400" algn="l" defTabSz="914400" rtl="0" eaLnBrk="1" latinLnBrk="1" hangingPunct="1">
+      <a:defRPr sz="1200" kern="1200">
+        <a:solidFill>
+          <a:schemeClr val="tx1"/>
+        </a:solidFill>
+        <a:latin typeface="+mn-lt"/>
+        <a:ea typeface="+mn-ea"/>
+        <a:cs typeface="+mn-cs"/>
+      </a:defRPr>
+    </a:lvl3pPr>
+    <a:lvl4pPr marL="1371600" algn="l" defTabSz="914400" rtl="0" eaLnBrk="1" latinLnBrk="1" hangingPunct="1">
+      <a:defRPr sz="1200" kern="1200">
+        <a:solidFill>
+          <a:schemeClr val="tx1"/>
+        </a:solidFill>
+        <a:latin typeface="+mn-lt"/>
+        <a:ea typeface="+mn-ea"/>
+        <a:cs typeface="+mn-cs"/>
+      </a:defRPr>
+    </a:lvl4pPr>
+    <a:lvl5pPr marL="1828800" algn="l" defTabSz="914400" rtl="0" eaLnBrk="1" latinLnBrk="1" hangingPunct="1">
+      <a:defRPr sz="1200" kern="1200">
+        <a:solidFill>
+          <a:schemeClr val="tx1"/>
+        </a:solidFill>
+        <a:latin typeface="+mn-lt"/>
+        <a:ea typeface="+mn-ea"/>
+        <a:cs typeface="+mn-cs"/>
+      </a:defRPr>
+    </a:lvl5pPr>
+    <a:lvl6pPr marL="2286000" algn="l" defTabSz="914400" rtl="0" eaLnBrk="1" latinLnBrk="1" hangingPunct="1">
+      <a:defRPr sz="1200" kern="1200">
+        <a:solidFill>
+          <a:schemeClr val="tx1"/>
+        </a:solidFill>
+        <a:latin typeface="+mn-lt"/>
+        <a:ea typeface="+mn-ea"/>
+        <a:cs typeface="+mn-cs"/>
+      </a:defRPr>
+    </a:lvl6pPr>
+    <a:lvl7pPr marL="2743200" algn="l" defTabSz="914400" rtl="0" eaLnBrk="1" latinLnBrk="1" hangingPunct="1">
+      <a:defRPr sz="1200" kern="1200">
+        <a:solidFill>
+          <a:schemeClr val="tx1"/>
+        </a:solidFill>
+        <a:latin typeface="+mn-lt"/>
+        <a:ea typeface="+mn-ea"/>
+        <a:cs typeface="+mn-cs"/>
+      </a:defRPr>
+    </a:lvl7pPr>
+    <a:lvl8pPr marL="3200400" algn="l" defTabSz="914400" rtl="0" eaLnBrk="1" latinLnBrk="1" hangingPunct="1">
+      <a:defRPr sz="1200" kern="1200">
+        <a:solidFill>
+          <a:schemeClr val="tx1"/>
+        </a:solidFill>
+        <a:latin typeface="+mn-lt"/>
+        <a:ea typeface="+mn-ea"/>
+        <a:cs typeface="+mn-cs"/>
+      </a:defRPr>
+    </a:lvl8pPr>
+    <a:lvl9pPr marL="3657600" algn="l" defTabSz="914400" rtl="0" eaLnBrk="1" latinLnBrk="1" hangingPunct="1">
+      <a:defRPr sz="1200" kern="1200">
+        <a:solidFill>
+          <a:schemeClr val="tx1"/>
+        </a:solidFill>
+        <a:latin typeface="+mn-lt"/>
+        <a:ea typeface="+mn-ea"/>
+        <a:cs typeface="+mn-cs"/>
+      </a:defRPr>
+    </a:lvl9pPr>
+  </p:notesStyle>
+</p:notesMaster>
+</file>
+
+<file path=ppt/notesSlides/notesSlide1.xml><?xml version="1.0" encoding="utf-8"?>
+<p:notes xmlns:a="http://schemas.openxmlformats.org/drawingml/2006/main" xmlns:r="http://schemas.openxmlformats.org/officeDocument/2006/relationships" xmlns:p="http://schemas.openxmlformats.org/presentationml/2006/main">
+  <p:cSld>
+    <p:spTree>
+      <p:nvGrpSpPr>
+        <p:cNvPr id="1" name=""/>
+        <p:cNvGrpSpPr/>
+        <p:nvPr/>
+      </p:nvGrpSpPr>
+      <p:grpSpPr>
+        <a:xfrm>
+          <a:off x="0" y="0"/>
+          <a:ext cx="0" cy="0"/>
+          <a:chOff x="0" y="0"/>
+          <a:chExt cx="0" cy="0"/>
+        </a:xfrm>
+      </p:grpSpPr>
+      <p:sp>
+        <p:nvSpPr>
+          <p:cNvPr id="2" name="슬라이드 이미지 개체 틀 1"/>
+          <p:cNvSpPr>
+            <a:spLocks noGrp="1" noRot="1" noChangeAspect="1"/>
+          </p:cNvSpPr>
+          <p:nvPr>
+            <p:ph type="sldImg"/>
+          </p:nvPr>
+        </p:nvSpPr>
+        <p:spPr/>
+      </p:sp>
+      <p:sp>
+        <p:nvSpPr>
+          <p:cNvPr id="3" name="슬라이드 노트 개체 틀 2"/>
+          <p:cNvSpPr>
+            <a:spLocks noGrp="1"/>
+          </p:cNvSpPr>
+          <p:nvPr>
+            <p:ph type="body" idx="1"/>
+          </p:nvPr>
+        </p:nvSpPr>
+        <p:spPr/>
+        <p:txBody>
+          <a:bodyPr/>
+          <a:lstStyle/>
+          <a:p>
+            <a:endParaRPr kumimoji="1" lang="ko-KR" altLang="en-US" dirty="0"/>
+          </a:p>
+        </p:txBody>
+      </p:sp>
+      <p:sp>
+        <p:nvSpPr>
+          <p:cNvPr id="4" name="슬라이드 번호 개체 틀 3"/>
+          <p:cNvSpPr>
+            <a:spLocks noGrp="1"/>
+          </p:cNvSpPr>
+          <p:nvPr>
+            <p:ph type="sldNum" sz="quarter" idx="5"/>
+          </p:nvPr>
+        </p:nvSpPr>
+        <p:spPr/>
+        <p:txBody>
+          <a:bodyPr/>
+          <a:lstStyle/>
+          <a:p>
+            <a:fld id="{C7D1C44E-14C5-4047-905B-19D9AA244188}" type="slidenum">
+              <a:rPr kumimoji="1" lang="ko-KR" altLang="en-US" smtClean="0"/>
+              <a:t>8</a:t>
+            </a:fld>
+            <a:endParaRPr kumimoji="1" lang="ko-KR" altLang="en-US"/>
+          </a:p>
+        </p:txBody>
+      </p:sp>
+    </p:spTree>
+    <p:extLst>
+      <p:ext uri="{BB962C8B-B14F-4D97-AF65-F5344CB8AC3E}">
+        <p14:creationId xmlns:p14="http://schemas.microsoft.com/office/powerpoint/2010/main" val="1683209507"/>
+      </p:ext>
+    </p:extLst>
+  </p:cSld>
+  <p:clrMapOvr>
+    <a:masterClrMapping/>
+  </p:clrMapOvr>
+</p:notes>
+</file>
+
 <file path=ppt/slideLayouts/slideLayout1.xml><?xml version="1.0" encoding="utf-8"?>
 <p:sldLayout xmlns:a="http://schemas.openxmlformats.org/drawingml/2006/main" xmlns:r="http://schemas.openxmlformats.org/officeDocument/2006/relationships" xmlns:p="http://schemas.openxmlformats.org/presentationml/2006/main" type="title" preserve="1">
   <p:cSld name="제목 슬라이드">
@@ -265,7 +702,7 @@
           <a:p>
             <a:fld id="{B2310862-A932-4A4D-BE7A-7832C8DBE490}" type="datetimeFigureOut">
               <a:rPr kumimoji="1" lang="ko-KR" altLang="en-US" smtClean="0"/>
-              <a:t>2024. 7. 17.</a:t>
+              <a:t>2024. 7. 29.</a:t>
             </a:fld>
             <a:endParaRPr kumimoji="1" lang="ko-KR" altLang="en-US"/>
           </a:p>
@@ -463,7 +900,7 @@
           <a:p>
             <a:fld id="{B2310862-A932-4A4D-BE7A-7832C8DBE490}" type="datetimeFigureOut">
               <a:rPr kumimoji="1" lang="ko-KR" altLang="en-US" smtClean="0"/>
-              <a:t>2024. 7. 17.</a:t>
+              <a:t>2024. 7. 29.</a:t>
             </a:fld>
             <a:endParaRPr kumimoji="1" lang="ko-KR" altLang="en-US"/>
           </a:p>
@@ -671,7 +1108,7 @@
           <a:p>
             <a:fld id="{B2310862-A932-4A4D-BE7A-7832C8DBE490}" type="datetimeFigureOut">
               <a:rPr kumimoji="1" lang="ko-KR" altLang="en-US" smtClean="0"/>
-              <a:t>2024. 7. 17.</a:t>
+              <a:t>2024. 7. 29.</a:t>
             </a:fld>
             <a:endParaRPr kumimoji="1" lang="ko-KR" altLang="en-US"/>
           </a:p>
@@ -869,7 +1306,7 @@
           <a:p>
             <a:fld id="{B2310862-A932-4A4D-BE7A-7832C8DBE490}" type="datetimeFigureOut">
               <a:rPr kumimoji="1" lang="ko-KR" altLang="en-US" smtClean="0"/>
-              <a:t>2024. 7. 17.</a:t>
+              <a:t>2024. 7. 29.</a:t>
             </a:fld>
             <a:endParaRPr kumimoji="1" lang="ko-KR" altLang="en-US"/>
           </a:p>
@@ -1144,7 +1581,7 @@
           <a:p>
             <a:fld id="{B2310862-A932-4A4D-BE7A-7832C8DBE490}" type="datetimeFigureOut">
               <a:rPr kumimoji="1" lang="ko-KR" altLang="en-US" smtClean="0"/>
-              <a:t>2024. 7. 17.</a:t>
+              <a:t>2024. 7. 29.</a:t>
             </a:fld>
             <a:endParaRPr kumimoji="1" lang="ko-KR" altLang="en-US"/>
           </a:p>
@@ -1409,7 +1846,7 @@
           <a:p>
             <a:fld id="{B2310862-A932-4A4D-BE7A-7832C8DBE490}" type="datetimeFigureOut">
               <a:rPr kumimoji="1" lang="ko-KR" altLang="en-US" smtClean="0"/>
-              <a:t>2024. 7. 17.</a:t>
+              <a:t>2024. 7. 29.</a:t>
             </a:fld>
             <a:endParaRPr kumimoji="1" lang="ko-KR" altLang="en-US"/>
           </a:p>
@@ -1821,7 +2258,7 @@
           <a:p>
             <a:fld id="{B2310862-A932-4A4D-BE7A-7832C8DBE490}" type="datetimeFigureOut">
               <a:rPr kumimoji="1" lang="ko-KR" altLang="en-US" smtClean="0"/>
-              <a:t>2024. 7. 17.</a:t>
+              <a:t>2024. 7. 29.</a:t>
             </a:fld>
             <a:endParaRPr kumimoji="1" lang="ko-KR" altLang="en-US"/>
           </a:p>
@@ -1962,7 +2399,7 @@
           <a:p>
             <a:fld id="{B2310862-A932-4A4D-BE7A-7832C8DBE490}" type="datetimeFigureOut">
               <a:rPr kumimoji="1" lang="ko-KR" altLang="en-US" smtClean="0"/>
-              <a:t>2024. 7. 17.</a:t>
+              <a:t>2024. 7. 29.</a:t>
             </a:fld>
             <a:endParaRPr kumimoji="1" lang="ko-KR" altLang="en-US"/>
           </a:p>
@@ -2075,7 +2512,7 @@
           <a:p>
             <a:fld id="{B2310862-A932-4A4D-BE7A-7832C8DBE490}" type="datetimeFigureOut">
               <a:rPr kumimoji="1" lang="ko-KR" altLang="en-US" smtClean="0"/>
-              <a:t>2024. 7. 17.</a:t>
+              <a:t>2024. 7. 29.</a:t>
             </a:fld>
             <a:endParaRPr kumimoji="1" lang="ko-KR" altLang="en-US"/>
           </a:p>
@@ -2386,7 +2823,7 @@
           <a:p>
             <a:fld id="{B2310862-A932-4A4D-BE7A-7832C8DBE490}" type="datetimeFigureOut">
               <a:rPr kumimoji="1" lang="ko-KR" altLang="en-US" smtClean="0"/>
-              <a:t>2024. 7. 17.</a:t>
+              <a:t>2024. 7. 29.</a:t>
             </a:fld>
             <a:endParaRPr kumimoji="1" lang="ko-KR" altLang="en-US"/>
           </a:p>
@@ -2674,7 +3111,7 @@
           <a:p>
             <a:fld id="{B2310862-A932-4A4D-BE7A-7832C8DBE490}" type="datetimeFigureOut">
               <a:rPr kumimoji="1" lang="ko-KR" altLang="en-US" smtClean="0"/>
-              <a:t>2024. 7. 17.</a:t>
+              <a:t>2024. 7. 29.</a:t>
             </a:fld>
             <a:endParaRPr kumimoji="1" lang="ko-KR" altLang="en-US"/>
           </a:p>
@@ -2915,7 +3352,7 @@
           <a:p>
             <a:fld id="{B2310862-A932-4A4D-BE7A-7832C8DBE490}" type="datetimeFigureOut">
               <a:rPr kumimoji="1" lang="ko-KR" altLang="en-US" smtClean="0"/>
-              <a:t>2024. 7. 17.</a:t>
+              <a:t>2024. 7. 29.</a:t>
             </a:fld>
             <a:endParaRPr kumimoji="1" lang="ko-KR" altLang="en-US"/>
           </a:p>
@@ -12573,6 +13010,2720 @@
 </p:sld>
 </file>
 
+<file path=ppt/slides/slide8.xml><?xml version="1.0" encoding="utf-8"?>
+<p:sld xmlns:a="http://schemas.openxmlformats.org/drawingml/2006/main" xmlns:r="http://schemas.openxmlformats.org/officeDocument/2006/relationships" xmlns:p="http://schemas.openxmlformats.org/presentationml/2006/main">
+  <p:cSld>
+    <p:spTree>
+      <p:nvGrpSpPr>
+        <p:cNvPr id="1" name=""/>
+        <p:cNvGrpSpPr/>
+        <p:nvPr/>
+      </p:nvGrpSpPr>
+      <p:grpSpPr>
+        <a:xfrm>
+          <a:off x="0" y="0"/>
+          <a:ext cx="0" cy="0"/>
+          <a:chOff x="0" y="0"/>
+          <a:chExt cx="0" cy="0"/>
+        </a:xfrm>
+      </p:grpSpPr>
+      <p:sp>
+        <p:nvSpPr>
+          <p:cNvPr id="49" name="직사각형 48">
+            <a:extLst>
+              <a:ext uri="{FF2B5EF4-FFF2-40B4-BE49-F238E27FC236}">
+                <a16:creationId xmlns:a16="http://schemas.microsoft.com/office/drawing/2014/main" id="{4004D496-165C-A205-931C-6241828D9318}"/>
+              </a:ext>
+            </a:extLst>
+          </p:cNvPr>
+          <p:cNvSpPr/>
+          <p:nvPr/>
+        </p:nvSpPr>
+        <p:spPr>
+          <a:xfrm>
+            <a:off x="5510807" y="1662665"/>
+            <a:ext cx="5450364" cy="3639629"/>
+          </a:xfrm>
+          <a:prstGeom prst="rect">
+            <a:avLst/>
+          </a:prstGeom>
+          <a:solidFill>
+            <a:schemeClr val="tx2">
+              <a:lumMod val="10000"/>
+              <a:lumOff val="90000"/>
+            </a:schemeClr>
+          </a:solidFill>
+          <a:ln>
+            <a:noFill/>
+          </a:ln>
+        </p:spPr>
+        <p:style>
+          <a:lnRef idx="2">
+            <a:schemeClr val="accent1">
+              <a:shade val="15000"/>
+            </a:schemeClr>
+          </a:lnRef>
+          <a:fillRef idx="1">
+            <a:schemeClr val="accent1"/>
+          </a:fillRef>
+          <a:effectRef idx="0">
+            <a:schemeClr val="accent1"/>
+          </a:effectRef>
+          <a:fontRef idx="minor">
+            <a:schemeClr val="lt1"/>
+          </a:fontRef>
+        </p:style>
+        <p:txBody>
+          <a:bodyPr rtlCol="0" anchor="ctr"/>
+          <a:lstStyle/>
+          <a:p>
+            <a:pPr algn="ctr"/>
+            <a:endParaRPr kumimoji="1" lang="ko-KR" altLang="en-US"/>
+          </a:p>
+        </p:txBody>
+      </p:sp>
+      <p:sp>
+        <p:nvSpPr>
+          <p:cNvPr id="50" name="직사각형 49">
+            <a:extLst>
+              <a:ext uri="{FF2B5EF4-FFF2-40B4-BE49-F238E27FC236}">
+                <a16:creationId xmlns:a16="http://schemas.microsoft.com/office/drawing/2014/main" id="{FA63EB88-6297-8C1E-239F-6C0B4E3A029D}"/>
+              </a:ext>
+            </a:extLst>
+          </p:cNvPr>
+          <p:cNvSpPr/>
+          <p:nvPr/>
+        </p:nvSpPr>
+        <p:spPr>
+          <a:xfrm>
+            <a:off x="863826" y="1662667"/>
+            <a:ext cx="4646267" cy="3639628"/>
+          </a:xfrm>
+          <a:prstGeom prst="rect">
+            <a:avLst/>
+          </a:prstGeom>
+          <a:solidFill>
+            <a:schemeClr val="accent2">
+              <a:lumMod val="20000"/>
+              <a:lumOff val="80000"/>
+            </a:schemeClr>
+          </a:solidFill>
+          <a:ln>
+            <a:noFill/>
+          </a:ln>
+        </p:spPr>
+        <p:style>
+          <a:lnRef idx="2">
+            <a:schemeClr val="accent1">
+              <a:shade val="15000"/>
+            </a:schemeClr>
+          </a:lnRef>
+          <a:fillRef idx="1">
+            <a:schemeClr val="accent1"/>
+          </a:fillRef>
+          <a:effectRef idx="0">
+            <a:schemeClr val="accent1"/>
+          </a:effectRef>
+          <a:fontRef idx="minor">
+            <a:schemeClr val="lt1"/>
+          </a:fontRef>
+        </p:style>
+        <p:txBody>
+          <a:bodyPr rtlCol="0" anchor="ctr"/>
+          <a:lstStyle/>
+          <a:p>
+            <a:pPr algn="ctr"/>
+            <a:endParaRPr kumimoji="1" lang="ko-KR" altLang="en-US"/>
+          </a:p>
+        </p:txBody>
+      </p:sp>
+      <p:pic>
+        <p:nvPicPr>
+          <p:cNvPr id="1026" name="Picture 2" descr="Amazon Bedrock Connector - Overview (O11) | OutSystems">
+            <a:extLst>
+              <a:ext uri="{FF2B5EF4-FFF2-40B4-BE49-F238E27FC236}">
+                <a16:creationId xmlns:a16="http://schemas.microsoft.com/office/drawing/2014/main" id="{6DA16296-BD32-D7F0-01D5-6C09271FAC81}"/>
+              </a:ext>
+            </a:extLst>
+          </p:cNvPr>
+          <p:cNvPicPr>
+            <a:picLocks noChangeAspect="1" noChangeArrowheads="1"/>
+          </p:cNvPicPr>
+          <p:nvPr/>
+        </p:nvPicPr>
+        <p:blipFill>
+          <a:blip r:embed="rId3">
+            <a:extLst>
+              <a:ext uri="{28A0092B-C50C-407E-A947-70E740481C1C}">
+                <a14:useLocalDpi xmlns:a14="http://schemas.microsoft.com/office/drawing/2010/main" val="0"/>
+              </a:ext>
+            </a:extLst>
+          </a:blip>
+          <a:srcRect/>
+          <a:stretch>
+            <a:fillRect/>
+          </a:stretch>
+        </p:blipFill>
+        <p:spPr bwMode="auto">
+          <a:xfrm>
+            <a:off x="2371775" y="2174458"/>
+            <a:ext cx="465430" cy="465430"/>
+          </a:xfrm>
+          <a:prstGeom prst="rect">
+            <a:avLst/>
+          </a:prstGeom>
+          <a:noFill/>
+          <a:extLst>
+            <a:ext uri="{909E8E84-426E-40DD-AFC4-6F175D3DCCD1}">
+              <a14:hiddenFill xmlns:a14="http://schemas.microsoft.com/office/drawing/2010/main">
+                <a:solidFill>
+                  <a:srgbClr val="FFFFFF"/>
+                </a:solidFill>
+              </a14:hiddenFill>
+            </a:ext>
+          </a:extLst>
+        </p:spPr>
+      </p:pic>
+      <p:sp>
+        <p:nvSpPr>
+          <p:cNvPr id="4" name="제목 1">
+            <a:extLst>
+              <a:ext uri="{FF2B5EF4-FFF2-40B4-BE49-F238E27FC236}">
+                <a16:creationId xmlns:a16="http://schemas.microsoft.com/office/drawing/2014/main" id="{6B3A304C-BFF1-2B0E-6D04-E3EBC01A9BD6}"/>
+              </a:ext>
+            </a:extLst>
+          </p:cNvPr>
+          <p:cNvSpPr txBox="1">
+            <a:spLocks/>
+          </p:cNvSpPr>
+          <p:nvPr/>
+        </p:nvSpPr>
+        <p:spPr>
+          <a:xfrm>
+            <a:off x="2234889" y="2625333"/>
+            <a:ext cx="739201" cy="267998"/>
+          </a:xfrm>
+          <a:prstGeom prst="rect">
+            <a:avLst/>
+          </a:prstGeom>
+        </p:spPr>
+        <p:txBody>
+          <a:bodyPr vert="horz" lIns="91440" tIns="45720" rIns="91440" bIns="45720" rtlCol="0" anchor="ctr">
+            <a:normAutofit/>
+          </a:bodyPr>
+          <a:lstStyle>
+            <a:lvl1pPr algn="l" defTabSz="914400" rtl="0" eaLnBrk="1" latinLnBrk="1" hangingPunct="1">
+              <a:lnSpc>
+                <a:spcPct val="90000"/>
+              </a:lnSpc>
+              <a:spcBef>
+                <a:spcPct val="0"/>
+              </a:spcBef>
+              <a:buNone/>
+              <a:defRPr sz="4400" kern="1200">
+                <a:solidFill>
+                  <a:schemeClr val="tx1"/>
+                </a:solidFill>
+                <a:latin typeface="+mj-lt"/>
+                <a:ea typeface="+mj-ea"/>
+                <a:cs typeface="+mj-cs"/>
+              </a:defRPr>
+            </a:lvl1pPr>
+          </a:lstStyle>
+          <a:p>
+            <a:pPr algn="ctr"/>
+            <a:r>
+              <a:rPr kumimoji="1" lang="en-US" altLang="ko-KR" sz="1100" b="1" dirty="0">
+                <a:latin typeface="KoPubWorldDotum Bold" pitchFamily="2" charset="-127"/>
+                <a:ea typeface="KoPubWorldDotum Bold" pitchFamily="2" charset="-127"/>
+                <a:cs typeface="KoPubWorldDotum Bold" pitchFamily="2" charset="-127"/>
+              </a:rPr>
+              <a:t>Bedrock</a:t>
+            </a:r>
+            <a:endParaRPr kumimoji="1" lang="ko-KR" altLang="en-US" sz="1100" b="1" dirty="0">
+              <a:latin typeface="KoPubWorldDotum Bold" pitchFamily="2" charset="-127"/>
+              <a:ea typeface="KoPubWorldDotum Bold" pitchFamily="2" charset="-127"/>
+              <a:cs typeface="KoPubWorldDotum Bold" pitchFamily="2" charset="-127"/>
+            </a:endParaRPr>
+          </a:p>
+        </p:txBody>
+      </p:sp>
+      <p:cxnSp>
+        <p:nvCxnSpPr>
+          <p:cNvPr id="9" name="직선 화살표 연결선 8">
+            <a:extLst>
+              <a:ext uri="{FF2B5EF4-FFF2-40B4-BE49-F238E27FC236}">
+                <a16:creationId xmlns:a16="http://schemas.microsoft.com/office/drawing/2014/main" id="{63F375FA-A27A-6ED8-2450-14C70EA8598F}"/>
+              </a:ext>
+            </a:extLst>
+          </p:cNvPr>
+          <p:cNvCxnSpPr>
+            <a:cxnSpLocks/>
+            <a:endCxn id="1026" idx="3"/>
+          </p:cNvCxnSpPr>
+          <p:nvPr/>
+        </p:nvCxnSpPr>
+        <p:spPr>
+          <a:xfrm flipH="1">
+            <a:off x="2837205" y="2401056"/>
+            <a:ext cx="647704" cy="6117"/>
+          </a:xfrm>
+          <a:prstGeom prst="straightConnector1">
+            <a:avLst/>
+          </a:prstGeom>
+          <a:ln>
+            <a:headEnd type="none" w="med" len="med"/>
+            <a:tailEnd type="none" w="med" len="med"/>
+          </a:ln>
+        </p:spPr>
+        <p:style>
+          <a:lnRef idx="2">
+            <a:schemeClr val="accent1"/>
+          </a:lnRef>
+          <a:fillRef idx="0">
+            <a:schemeClr val="accent1"/>
+          </a:fillRef>
+          <a:effectRef idx="1">
+            <a:schemeClr val="accent1"/>
+          </a:effectRef>
+          <a:fontRef idx="minor">
+            <a:schemeClr val="tx1"/>
+          </a:fontRef>
+        </p:style>
+      </p:cxnSp>
+      <p:cxnSp>
+        <p:nvCxnSpPr>
+          <p:cNvPr id="21" name="직선 화살표 연결선 20">
+            <a:extLst>
+              <a:ext uri="{FF2B5EF4-FFF2-40B4-BE49-F238E27FC236}">
+                <a16:creationId xmlns:a16="http://schemas.microsoft.com/office/drawing/2014/main" id="{8E155C8E-EF80-A08C-48C3-C23C7C6EF776}"/>
+              </a:ext>
+            </a:extLst>
+          </p:cNvPr>
+          <p:cNvCxnSpPr>
+            <a:cxnSpLocks/>
+            <a:stCxn id="24" idx="1"/>
+          </p:cNvCxnSpPr>
+          <p:nvPr/>
+        </p:nvCxnSpPr>
+        <p:spPr>
+          <a:xfrm flipH="1" flipV="1">
+            <a:off x="4696908" y="2389899"/>
+            <a:ext cx="998340" cy="1"/>
+          </a:xfrm>
+          <a:prstGeom prst="straightConnector1">
+            <a:avLst/>
+          </a:prstGeom>
+          <a:ln>
+            <a:headEnd type="none" w="med" len="med"/>
+            <a:tailEnd type="none" w="med" len="med"/>
+          </a:ln>
+        </p:spPr>
+        <p:style>
+          <a:lnRef idx="2">
+            <a:schemeClr val="accent1"/>
+          </a:lnRef>
+          <a:fillRef idx="0">
+            <a:schemeClr val="accent1"/>
+          </a:fillRef>
+          <a:effectRef idx="1">
+            <a:schemeClr val="accent1"/>
+          </a:effectRef>
+          <a:fontRef idx="minor">
+            <a:schemeClr val="tx1"/>
+          </a:fontRef>
+        </p:style>
+      </p:cxnSp>
+      <p:sp>
+        <p:nvSpPr>
+          <p:cNvPr id="8" name="제목 1">
+            <a:extLst>
+              <a:ext uri="{FF2B5EF4-FFF2-40B4-BE49-F238E27FC236}">
+                <a16:creationId xmlns:a16="http://schemas.microsoft.com/office/drawing/2014/main" id="{7CB821EA-A35B-3E71-C9DD-00E24904DF39}"/>
+              </a:ext>
+            </a:extLst>
+          </p:cNvPr>
+          <p:cNvSpPr txBox="1">
+            <a:spLocks/>
+          </p:cNvSpPr>
+          <p:nvPr/>
+        </p:nvSpPr>
+        <p:spPr>
+          <a:xfrm>
+            <a:off x="1001478" y="2658056"/>
+            <a:ext cx="1206609" cy="267998"/>
+          </a:xfrm>
+          <a:prstGeom prst="rect">
+            <a:avLst/>
+          </a:prstGeom>
+        </p:spPr>
+        <p:txBody>
+          <a:bodyPr vert="horz" lIns="91440" tIns="45720" rIns="91440" bIns="45720" rtlCol="0" anchor="ctr">
+            <a:normAutofit fontScale="92500"/>
+          </a:bodyPr>
+          <a:lstStyle>
+            <a:lvl1pPr algn="l" defTabSz="914400" rtl="0" eaLnBrk="1" latinLnBrk="1" hangingPunct="1">
+              <a:lnSpc>
+                <a:spcPct val="90000"/>
+              </a:lnSpc>
+              <a:spcBef>
+                <a:spcPct val="0"/>
+              </a:spcBef>
+              <a:buNone/>
+              <a:defRPr sz="4400" kern="1200">
+                <a:solidFill>
+                  <a:schemeClr val="tx1"/>
+                </a:solidFill>
+                <a:latin typeface="+mj-lt"/>
+                <a:ea typeface="+mj-ea"/>
+                <a:cs typeface="+mj-cs"/>
+              </a:defRPr>
+            </a:lvl1pPr>
+          </a:lstStyle>
+          <a:p>
+            <a:pPr algn="ctr"/>
+            <a:r>
+              <a:rPr kumimoji="1" lang="en-US" altLang="ko-KR" sz="1100" b="1" dirty="0">
+                <a:latin typeface="KoPubWorldDotum Bold" pitchFamily="2" charset="-127"/>
+                <a:ea typeface="KoPubWorldDotum Bold" pitchFamily="2" charset="-127"/>
+                <a:cs typeface="KoPubWorldDotum Bold" pitchFamily="2" charset="-127"/>
+              </a:rPr>
+              <a:t>Claude 3 Sonnet</a:t>
+            </a:r>
+            <a:endParaRPr kumimoji="1" lang="ko-KR" altLang="en-US" sz="1100" b="1" dirty="0">
+              <a:latin typeface="KoPubWorldDotum Bold" pitchFamily="2" charset="-127"/>
+              <a:ea typeface="KoPubWorldDotum Bold" pitchFamily="2" charset="-127"/>
+              <a:cs typeface="KoPubWorldDotum Bold" pitchFamily="2" charset="-127"/>
+            </a:endParaRPr>
+          </a:p>
+        </p:txBody>
+      </p:sp>
+      <p:cxnSp>
+        <p:nvCxnSpPr>
+          <p:cNvPr id="10" name="직선 화살표 연결선 9">
+            <a:extLst>
+              <a:ext uri="{FF2B5EF4-FFF2-40B4-BE49-F238E27FC236}">
+                <a16:creationId xmlns:a16="http://schemas.microsoft.com/office/drawing/2014/main" id="{34C6F30D-1D00-1EFC-D3FA-EA475CB610D4}"/>
+              </a:ext>
+            </a:extLst>
+          </p:cNvPr>
+          <p:cNvCxnSpPr>
+            <a:cxnSpLocks/>
+            <a:stCxn id="1026" idx="1"/>
+          </p:cNvCxnSpPr>
+          <p:nvPr/>
+        </p:nvCxnSpPr>
+        <p:spPr>
+          <a:xfrm flipH="1">
+            <a:off x="1858063" y="2407173"/>
+            <a:ext cx="513712" cy="7056"/>
+          </a:xfrm>
+          <a:prstGeom prst="straightConnector1">
+            <a:avLst/>
+          </a:prstGeom>
+          <a:ln>
+            <a:headEnd type="none" w="med" len="med"/>
+            <a:tailEnd type="none" w="med" len="med"/>
+          </a:ln>
+        </p:spPr>
+        <p:style>
+          <a:lnRef idx="2">
+            <a:schemeClr val="accent1"/>
+          </a:lnRef>
+          <a:fillRef idx="0">
+            <a:schemeClr val="accent1"/>
+          </a:fillRef>
+          <a:effectRef idx="1">
+            <a:schemeClr val="accent1"/>
+          </a:effectRef>
+          <a:fontRef idx="minor">
+            <a:schemeClr val="tx1"/>
+          </a:fontRef>
+        </p:style>
+      </p:cxnSp>
+      <p:pic>
+        <p:nvPicPr>
+          <p:cNvPr id="13" name="Picture 2" descr="The AI wars heat up with Claude 3, claimed to have “near-human” abilities |  Ars Technica">
+            <a:extLst>
+              <a:ext uri="{FF2B5EF4-FFF2-40B4-BE49-F238E27FC236}">
+                <a16:creationId xmlns:a16="http://schemas.microsoft.com/office/drawing/2014/main" id="{9106017E-A991-4292-85EB-1286A8B1B55F}"/>
+              </a:ext>
+            </a:extLst>
+          </p:cNvPr>
+          <p:cNvPicPr>
+            <a:picLocks noChangeAspect="1" noChangeArrowheads="1"/>
+          </p:cNvPicPr>
+          <p:nvPr/>
+        </p:nvPicPr>
+        <p:blipFill rotWithShape="1">
+          <a:blip r:embed="rId4">
+            <a:extLst>
+              <a:ext uri="{28A0092B-C50C-407E-A947-70E740481C1C}">
+                <a14:useLocalDpi xmlns:a14="http://schemas.microsoft.com/office/drawing/2010/main" val="0"/>
+              </a:ext>
+            </a:extLst>
+          </a:blip>
+          <a:srcRect l="28567" t="10984" r="29591" b="14630"/>
+          <a:stretch/>
+        </p:blipFill>
+        <p:spPr bwMode="auto">
+          <a:xfrm>
+            <a:off x="1413072" y="2186652"/>
+            <a:ext cx="465430" cy="465430"/>
+          </a:xfrm>
+          <a:prstGeom prst="rect">
+            <a:avLst/>
+          </a:prstGeom>
+          <a:noFill/>
+          <a:extLst>
+            <a:ext uri="{909E8E84-426E-40DD-AFC4-6F175D3DCCD1}">
+              <a14:hiddenFill xmlns:a14="http://schemas.microsoft.com/office/drawing/2010/main">
+                <a:solidFill>
+                  <a:srgbClr val="FFFFFF"/>
+                </a:solidFill>
+              </a14:hiddenFill>
+            </a:ext>
+          </a:extLst>
+        </p:spPr>
+      </p:pic>
+      <p:pic>
+        <p:nvPicPr>
+          <p:cNvPr id="3" name="Picture 2" descr="Amazon Bedrock Connector - Overview (O11) | OutSystems">
+            <a:extLst>
+              <a:ext uri="{FF2B5EF4-FFF2-40B4-BE49-F238E27FC236}">
+                <a16:creationId xmlns:a16="http://schemas.microsoft.com/office/drawing/2014/main" id="{0CC4E556-84F1-E509-8785-5CDBC5B57903}"/>
+              </a:ext>
+            </a:extLst>
+          </p:cNvPr>
+          <p:cNvPicPr>
+            <a:picLocks noChangeAspect="1" noChangeArrowheads="1"/>
+          </p:cNvPicPr>
+          <p:nvPr/>
+        </p:nvPicPr>
+        <p:blipFill>
+          <a:blip r:embed="rId3">
+            <a:alphaModFix amt="35000"/>
+            <a:extLst>
+              <a:ext uri="{28A0092B-C50C-407E-A947-70E740481C1C}">
+                <a14:useLocalDpi xmlns:a14="http://schemas.microsoft.com/office/drawing/2010/main" val="0"/>
+              </a:ext>
+            </a:extLst>
+          </a:blip>
+          <a:srcRect/>
+          <a:stretch>
+            <a:fillRect/>
+          </a:stretch>
+        </p:blipFill>
+        <p:spPr bwMode="auto">
+          <a:xfrm>
+            <a:off x="1906345" y="3071928"/>
+            <a:ext cx="465430" cy="465430"/>
+          </a:xfrm>
+          <a:prstGeom prst="rect">
+            <a:avLst/>
+          </a:prstGeom>
+          <a:noFill/>
+          <a:extLst>
+            <a:ext uri="{909E8E84-426E-40DD-AFC4-6F175D3DCCD1}">
+              <a14:hiddenFill xmlns:a14="http://schemas.microsoft.com/office/drawing/2010/main">
+                <a:solidFill>
+                  <a:srgbClr val="FFFFFF"/>
+                </a:solidFill>
+              </a14:hiddenFill>
+            </a:ext>
+          </a:extLst>
+        </p:spPr>
+      </p:pic>
+      <p:sp>
+        <p:nvSpPr>
+          <p:cNvPr id="6" name="제목 1">
+            <a:extLst>
+              <a:ext uri="{FF2B5EF4-FFF2-40B4-BE49-F238E27FC236}">
+                <a16:creationId xmlns:a16="http://schemas.microsoft.com/office/drawing/2014/main" id="{E3E7097A-D899-57F0-AA84-4CA445238B28}"/>
+              </a:ext>
+            </a:extLst>
+          </p:cNvPr>
+          <p:cNvSpPr txBox="1">
+            <a:spLocks/>
+          </p:cNvSpPr>
+          <p:nvPr/>
+        </p:nvSpPr>
+        <p:spPr>
+          <a:xfrm>
+            <a:off x="1535755" y="3532729"/>
+            <a:ext cx="1206609" cy="267998"/>
+          </a:xfrm>
+          <a:prstGeom prst="rect">
+            <a:avLst/>
+          </a:prstGeom>
+        </p:spPr>
+        <p:txBody>
+          <a:bodyPr vert="horz" lIns="91440" tIns="45720" rIns="91440" bIns="45720" rtlCol="0" anchor="ctr">
+            <a:normAutofit/>
+          </a:bodyPr>
+          <a:lstStyle>
+            <a:lvl1pPr algn="l" defTabSz="914400" rtl="0" eaLnBrk="1" latinLnBrk="1" hangingPunct="1">
+              <a:lnSpc>
+                <a:spcPct val="90000"/>
+              </a:lnSpc>
+              <a:spcBef>
+                <a:spcPct val="0"/>
+              </a:spcBef>
+              <a:buNone/>
+              <a:defRPr sz="4400" kern="1200">
+                <a:solidFill>
+                  <a:schemeClr val="tx1"/>
+                </a:solidFill>
+                <a:latin typeface="+mj-lt"/>
+                <a:ea typeface="+mj-ea"/>
+                <a:cs typeface="+mj-cs"/>
+              </a:defRPr>
+            </a:lvl1pPr>
+          </a:lstStyle>
+          <a:p>
+            <a:pPr algn="ctr"/>
+            <a:r>
+              <a:rPr kumimoji="1" lang="en-US" altLang="ko-KR" sz="1100" b="1" dirty="0">
+                <a:latin typeface="KoPubWorldDotum Bold" pitchFamily="2" charset="-127"/>
+                <a:ea typeface="KoPubWorldDotum Bold" pitchFamily="2" charset="-127"/>
+                <a:cs typeface="KoPubWorldDotum Bold" pitchFamily="2" charset="-127"/>
+              </a:rPr>
+              <a:t>Bedrock</a:t>
+            </a:r>
+            <a:r>
+              <a:rPr kumimoji="1" lang="ko-KR" altLang="en-US" sz="1100" b="1" dirty="0">
+                <a:latin typeface="KoPubWorldDotum Bold" pitchFamily="2" charset="-127"/>
+                <a:ea typeface="KoPubWorldDotum Bold" pitchFamily="2" charset="-127"/>
+                <a:cs typeface="KoPubWorldDotum Bold" pitchFamily="2" charset="-127"/>
+              </a:rPr>
+              <a:t> </a:t>
+            </a:r>
+            <a:r>
+              <a:rPr kumimoji="1" lang="en-US" altLang="ko-KR" sz="1100" b="1" dirty="0">
+                <a:latin typeface="KoPubWorldDotum Bold" pitchFamily="2" charset="-127"/>
+                <a:ea typeface="KoPubWorldDotum Bold" pitchFamily="2" charset="-127"/>
+                <a:cs typeface="KoPubWorldDotum Bold" pitchFamily="2" charset="-127"/>
+              </a:rPr>
+              <a:t>Agent</a:t>
+            </a:r>
+            <a:endParaRPr kumimoji="1" lang="ko-KR" altLang="en-US" sz="1100" b="1" dirty="0">
+              <a:latin typeface="KoPubWorldDotum Bold" pitchFamily="2" charset="-127"/>
+              <a:ea typeface="KoPubWorldDotum Bold" pitchFamily="2" charset="-127"/>
+              <a:cs typeface="KoPubWorldDotum Bold" pitchFamily="2" charset="-127"/>
+            </a:endParaRPr>
+          </a:p>
+        </p:txBody>
+      </p:sp>
+      <p:cxnSp>
+        <p:nvCxnSpPr>
+          <p:cNvPr id="7" name="직선 화살표 연결선 6">
+            <a:extLst>
+              <a:ext uri="{FF2B5EF4-FFF2-40B4-BE49-F238E27FC236}">
+                <a16:creationId xmlns:a16="http://schemas.microsoft.com/office/drawing/2014/main" id="{17E95AC4-2D1B-C68E-4C2F-4CD0921C8E04}"/>
+              </a:ext>
+            </a:extLst>
+          </p:cNvPr>
+          <p:cNvCxnSpPr>
+            <a:cxnSpLocks/>
+          </p:cNvCxnSpPr>
+          <p:nvPr/>
+        </p:nvCxnSpPr>
+        <p:spPr>
+          <a:xfrm>
+            <a:off x="2139059" y="2414229"/>
+            <a:ext cx="0" cy="661227"/>
+          </a:xfrm>
+          <a:prstGeom prst="straightConnector1">
+            <a:avLst/>
+          </a:prstGeom>
+          <a:ln>
+            <a:headEnd type="none" w="med" len="med"/>
+            <a:tailEnd type="none" w="med" len="med"/>
+          </a:ln>
+        </p:spPr>
+        <p:style>
+          <a:lnRef idx="2">
+            <a:schemeClr val="accent1"/>
+          </a:lnRef>
+          <a:fillRef idx="0">
+            <a:schemeClr val="accent1"/>
+          </a:fillRef>
+          <a:effectRef idx="1">
+            <a:schemeClr val="accent1"/>
+          </a:effectRef>
+          <a:fontRef idx="minor">
+            <a:schemeClr val="tx1"/>
+          </a:fontRef>
+        </p:style>
+      </p:cxnSp>
+      <p:sp>
+        <p:nvSpPr>
+          <p:cNvPr id="16" name="제목 1">
+            <a:extLst>
+              <a:ext uri="{FF2B5EF4-FFF2-40B4-BE49-F238E27FC236}">
+                <a16:creationId xmlns:a16="http://schemas.microsoft.com/office/drawing/2014/main" id="{5BAB6A00-4CF3-7A79-987B-9DEFE62CB6F7}"/>
+              </a:ext>
+            </a:extLst>
+          </p:cNvPr>
+          <p:cNvSpPr txBox="1">
+            <a:spLocks/>
+          </p:cNvSpPr>
+          <p:nvPr/>
+        </p:nvSpPr>
+        <p:spPr>
+          <a:xfrm>
+            <a:off x="3727894" y="3285600"/>
+            <a:ext cx="739201" cy="267998"/>
+          </a:xfrm>
+          <a:prstGeom prst="rect">
+            <a:avLst/>
+          </a:prstGeom>
+        </p:spPr>
+        <p:txBody>
+          <a:bodyPr vert="horz" lIns="91440" tIns="45720" rIns="91440" bIns="45720" rtlCol="0" anchor="ctr">
+            <a:normAutofit/>
+          </a:bodyPr>
+          <a:lstStyle>
+            <a:lvl1pPr algn="l" defTabSz="914400" rtl="0" eaLnBrk="1" latinLnBrk="1" hangingPunct="1">
+              <a:lnSpc>
+                <a:spcPct val="90000"/>
+              </a:lnSpc>
+              <a:spcBef>
+                <a:spcPct val="0"/>
+              </a:spcBef>
+              <a:buNone/>
+              <a:defRPr sz="4400" kern="1200">
+                <a:solidFill>
+                  <a:schemeClr val="tx1"/>
+                </a:solidFill>
+                <a:latin typeface="+mj-lt"/>
+                <a:ea typeface="+mj-ea"/>
+                <a:cs typeface="+mj-cs"/>
+              </a:defRPr>
+            </a:lvl1pPr>
+          </a:lstStyle>
+          <a:p>
+            <a:pPr algn="ctr"/>
+            <a:r>
+              <a:rPr kumimoji="1" lang="en-US" altLang="ko-KR" sz="1100" b="1" dirty="0">
+                <a:latin typeface="KoPubWorldDotum Bold" pitchFamily="2" charset="-127"/>
+                <a:ea typeface="KoPubWorldDotum Bold" pitchFamily="2" charset="-127"/>
+                <a:cs typeface="KoPubWorldDotum Bold" pitchFamily="2" charset="-127"/>
+              </a:rPr>
+              <a:t>Lambda</a:t>
+            </a:r>
+            <a:endParaRPr kumimoji="1" lang="ko-KR" altLang="en-US" sz="1100" b="1" dirty="0">
+              <a:latin typeface="KoPubWorldDotum Bold" pitchFamily="2" charset="-127"/>
+              <a:ea typeface="KoPubWorldDotum Bold" pitchFamily="2" charset="-127"/>
+              <a:cs typeface="KoPubWorldDotum Bold" pitchFamily="2" charset="-127"/>
+            </a:endParaRPr>
+          </a:p>
+        </p:txBody>
+      </p:sp>
+      <p:pic>
+        <p:nvPicPr>
+          <p:cNvPr id="18" name="그림 17">
+            <a:extLst>
+              <a:ext uri="{FF2B5EF4-FFF2-40B4-BE49-F238E27FC236}">
+                <a16:creationId xmlns:a16="http://schemas.microsoft.com/office/drawing/2014/main" id="{E4E2557D-5953-C1A9-118E-BEB9C692C0BE}"/>
+              </a:ext>
+            </a:extLst>
+          </p:cNvPr>
+          <p:cNvPicPr>
+            <a:picLocks noChangeAspect="1"/>
+          </p:cNvPicPr>
+          <p:nvPr/>
+        </p:nvPicPr>
+        <p:blipFill>
+          <a:blip r:embed="rId5"/>
+          <a:stretch>
+            <a:fillRect/>
+          </a:stretch>
+        </p:blipFill>
+        <p:spPr>
+          <a:xfrm>
+            <a:off x="4457924" y="3402268"/>
+            <a:ext cx="465429" cy="465429"/>
+          </a:xfrm>
+          <a:prstGeom prst="rect">
+            <a:avLst/>
+          </a:prstGeom>
+        </p:spPr>
+      </p:pic>
+      <p:sp>
+        <p:nvSpPr>
+          <p:cNvPr id="19" name="제목 1">
+            <a:extLst>
+              <a:ext uri="{FF2B5EF4-FFF2-40B4-BE49-F238E27FC236}">
+                <a16:creationId xmlns:a16="http://schemas.microsoft.com/office/drawing/2014/main" id="{43B19051-C4DB-2973-13E0-26D3E5B051C2}"/>
+              </a:ext>
+            </a:extLst>
+          </p:cNvPr>
+          <p:cNvSpPr txBox="1">
+            <a:spLocks/>
+          </p:cNvSpPr>
+          <p:nvPr/>
+        </p:nvSpPr>
+        <p:spPr>
+          <a:xfrm>
+            <a:off x="4245033" y="3828819"/>
+            <a:ext cx="869150" cy="267998"/>
+          </a:xfrm>
+          <a:prstGeom prst="rect">
+            <a:avLst/>
+          </a:prstGeom>
+        </p:spPr>
+        <p:txBody>
+          <a:bodyPr vert="horz" lIns="91440" tIns="45720" rIns="91440" bIns="45720" rtlCol="0" anchor="ctr">
+            <a:normAutofit fontScale="92500"/>
+          </a:bodyPr>
+          <a:lstStyle>
+            <a:lvl1pPr algn="l" defTabSz="914400" rtl="0" eaLnBrk="1" latinLnBrk="1" hangingPunct="1">
+              <a:lnSpc>
+                <a:spcPct val="90000"/>
+              </a:lnSpc>
+              <a:spcBef>
+                <a:spcPct val="0"/>
+              </a:spcBef>
+              <a:buNone/>
+              <a:defRPr sz="4400" kern="1200">
+                <a:solidFill>
+                  <a:schemeClr val="tx1"/>
+                </a:solidFill>
+                <a:latin typeface="+mj-lt"/>
+                <a:ea typeface="+mj-ea"/>
+                <a:cs typeface="+mj-cs"/>
+              </a:defRPr>
+            </a:lvl1pPr>
+          </a:lstStyle>
+          <a:p>
+            <a:pPr algn="ctr"/>
+            <a:r>
+              <a:rPr kumimoji="1" lang="en-US" altLang="ko-KR" sz="1100" b="1" dirty="0">
+                <a:latin typeface="KoPubWorldDotum Bold" pitchFamily="2" charset="-127"/>
+                <a:ea typeface="KoPubWorldDotum Bold" pitchFamily="2" charset="-127"/>
+                <a:cs typeface="KoPubWorldDotum Bold" pitchFamily="2" charset="-127"/>
+              </a:rPr>
+              <a:t>DynamoDB</a:t>
+            </a:r>
+            <a:endParaRPr kumimoji="1" lang="ko-KR" altLang="en-US" sz="1100" b="1" dirty="0">
+              <a:latin typeface="KoPubWorldDotum Bold" pitchFamily="2" charset="-127"/>
+              <a:ea typeface="KoPubWorldDotum Bold" pitchFamily="2" charset="-127"/>
+              <a:cs typeface="KoPubWorldDotum Bold" pitchFamily="2" charset="-127"/>
+            </a:endParaRPr>
+          </a:p>
+        </p:txBody>
+      </p:sp>
+      <p:sp>
+        <p:nvSpPr>
+          <p:cNvPr id="34" name="직사각형 33">
+            <a:extLst>
+              <a:ext uri="{FF2B5EF4-FFF2-40B4-BE49-F238E27FC236}">
+                <a16:creationId xmlns:a16="http://schemas.microsoft.com/office/drawing/2014/main" id="{EBA2B3B8-949E-8DED-AAA1-436BC209F8B2}"/>
+              </a:ext>
+            </a:extLst>
+          </p:cNvPr>
+          <p:cNvSpPr/>
+          <p:nvPr/>
+        </p:nvSpPr>
+        <p:spPr>
+          <a:xfrm>
+            <a:off x="863112" y="1654630"/>
+            <a:ext cx="10098059" cy="3647664"/>
+          </a:xfrm>
+          <a:prstGeom prst="rect">
+            <a:avLst/>
+          </a:prstGeom>
+          <a:noFill/>
+          <a:ln>
+            <a:solidFill>
+              <a:srgbClr val="000000"/>
+            </a:solidFill>
+            <a:prstDash val="sysDash"/>
+          </a:ln>
+        </p:spPr>
+        <p:style>
+          <a:lnRef idx="2">
+            <a:schemeClr val="accent1">
+              <a:shade val="15000"/>
+            </a:schemeClr>
+          </a:lnRef>
+          <a:fillRef idx="1">
+            <a:schemeClr val="accent1"/>
+          </a:fillRef>
+          <a:effectRef idx="0">
+            <a:schemeClr val="accent1"/>
+          </a:effectRef>
+          <a:fontRef idx="minor">
+            <a:schemeClr val="lt1"/>
+          </a:fontRef>
+        </p:style>
+        <p:txBody>
+          <a:bodyPr rtlCol="0" anchor="ctr"/>
+          <a:lstStyle/>
+          <a:p>
+            <a:pPr algn="ctr"/>
+            <a:endParaRPr kumimoji="1" lang="ko-KR" altLang="en-US"/>
+          </a:p>
+        </p:txBody>
+      </p:sp>
+      <p:pic>
+        <p:nvPicPr>
+          <p:cNvPr id="35" name="Picture 4" descr="Amazon Web Services | Incentro Partner">
+            <a:extLst>
+              <a:ext uri="{FF2B5EF4-FFF2-40B4-BE49-F238E27FC236}">
+                <a16:creationId xmlns:a16="http://schemas.microsoft.com/office/drawing/2014/main" id="{06395187-BBE3-4B5C-AD65-36D52954BD51}"/>
+              </a:ext>
+            </a:extLst>
+          </p:cNvPr>
+          <p:cNvPicPr>
+            <a:picLocks noChangeAspect="1" noChangeArrowheads="1"/>
+          </p:cNvPicPr>
+          <p:nvPr/>
+        </p:nvPicPr>
+        <p:blipFill>
+          <a:blip r:embed="rId6">
+            <a:extLst>
+              <a:ext uri="{28A0092B-C50C-407E-A947-70E740481C1C}">
+                <a14:useLocalDpi xmlns:a14="http://schemas.microsoft.com/office/drawing/2010/main" val="0"/>
+              </a:ext>
+            </a:extLst>
+          </a:blip>
+          <a:srcRect/>
+          <a:stretch>
+            <a:fillRect/>
+          </a:stretch>
+        </p:blipFill>
+        <p:spPr bwMode="auto">
+          <a:xfrm>
+            <a:off x="863112" y="1654630"/>
+            <a:ext cx="377292" cy="377292"/>
+          </a:xfrm>
+          <a:prstGeom prst="rect">
+            <a:avLst/>
+          </a:prstGeom>
+          <a:noFill/>
+          <a:extLst>
+            <a:ext uri="{909E8E84-426E-40DD-AFC4-6F175D3DCCD1}">
+              <a14:hiddenFill xmlns:a14="http://schemas.microsoft.com/office/drawing/2010/main">
+                <a:solidFill>
+                  <a:srgbClr val="FFFFFF"/>
+                </a:solidFill>
+              </a14:hiddenFill>
+            </a:ext>
+          </a:extLst>
+        </p:spPr>
+      </p:pic>
+      <p:pic>
+        <p:nvPicPr>
+          <p:cNvPr id="63" name="그림 62">
+            <a:extLst>
+              <a:ext uri="{FF2B5EF4-FFF2-40B4-BE49-F238E27FC236}">
+                <a16:creationId xmlns:a16="http://schemas.microsoft.com/office/drawing/2014/main" id="{30AA3DF9-0C34-53E0-3770-48ED28E21865}"/>
+              </a:ext>
+            </a:extLst>
+          </p:cNvPr>
+          <p:cNvPicPr>
+            <a:picLocks noChangeAspect="1"/>
+          </p:cNvPicPr>
+          <p:nvPr/>
+        </p:nvPicPr>
+        <p:blipFill>
+          <a:blip r:embed="rId7"/>
+          <a:stretch>
+            <a:fillRect/>
+          </a:stretch>
+        </p:blipFill>
+        <p:spPr>
+          <a:xfrm>
+            <a:off x="3855392" y="4316138"/>
+            <a:ext cx="462142" cy="462142"/>
+          </a:xfrm>
+          <a:prstGeom prst="rect">
+            <a:avLst/>
+          </a:prstGeom>
+        </p:spPr>
+      </p:pic>
+      <p:pic>
+        <p:nvPicPr>
+          <p:cNvPr id="24" name="그림 23">
+            <a:extLst>
+              <a:ext uri="{FF2B5EF4-FFF2-40B4-BE49-F238E27FC236}">
+                <a16:creationId xmlns:a16="http://schemas.microsoft.com/office/drawing/2014/main" id="{E5C7CE01-3AD3-869D-EAEB-D8D94DCA248B}"/>
+              </a:ext>
+            </a:extLst>
+          </p:cNvPr>
+          <p:cNvPicPr>
+            <a:picLocks noChangeAspect="1"/>
+          </p:cNvPicPr>
+          <p:nvPr/>
+        </p:nvPicPr>
+        <p:blipFill>
+          <a:blip r:embed="rId8"/>
+          <a:stretch>
+            <a:fillRect/>
+          </a:stretch>
+        </p:blipFill>
+        <p:spPr>
+          <a:xfrm>
+            <a:off x="5695248" y="2159237"/>
+            <a:ext cx="461326" cy="461326"/>
+          </a:xfrm>
+          <a:prstGeom prst="rect">
+            <a:avLst/>
+          </a:prstGeom>
+        </p:spPr>
+      </p:pic>
+      <p:sp>
+        <p:nvSpPr>
+          <p:cNvPr id="28" name="직사각형 27">
+            <a:extLst>
+              <a:ext uri="{FF2B5EF4-FFF2-40B4-BE49-F238E27FC236}">
+                <a16:creationId xmlns:a16="http://schemas.microsoft.com/office/drawing/2014/main" id="{B74730AF-E164-6232-603B-2E81071DA6AA}"/>
+              </a:ext>
+            </a:extLst>
+          </p:cNvPr>
+          <p:cNvSpPr/>
+          <p:nvPr/>
+        </p:nvSpPr>
+        <p:spPr>
+          <a:xfrm>
+            <a:off x="7340979" y="1910634"/>
+            <a:ext cx="1503655" cy="1093027"/>
+          </a:xfrm>
+          <a:prstGeom prst="rect">
+            <a:avLst/>
+          </a:prstGeom>
+          <a:noFill/>
+          <a:ln>
+            <a:solidFill>
+              <a:srgbClr val="000000"/>
+            </a:solidFill>
+            <a:prstDash val="sysDash"/>
+          </a:ln>
+        </p:spPr>
+        <p:style>
+          <a:lnRef idx="2">
+            <a:schemeClr val="accent1">
+              <a:shade val="15000"/>
+            </a:schemeClr>
+          </a:lnRef>
+          <a:fillRef idx="1">
+            <a:schemeClr val="accent1"/>
+          </a:fillRef>
+          <a:effectRef idx="0">
+            <a:schemeClr val="accent1"/>
+          </a:effectRef>
+          <a:fontRef idx="minor">
+            <a:schemeClr val="lt1"/>
+          </a:fontRef>
+        </p:style>
+        <p:txBody>
+          <a:bodyPr rtlCol="0" anchor="ctr"/>
+          <a:lstStyle/>
+          <a:p>
+            <a:pPr algn="ctr"/>
+            <a:endParaRPr kumimoji="1" lang="ko-KR" altLang="en-US"/>
+          </a:p>
+        </p:txBody>
+      </p:sp>
+      <p:pic>
+        <p:nvPicPr>
+          <p:cNvPr id="29" name="그림 28">
+            <a:extLst>
+              <a:ext uri="{FF2B5EF4-FFF2-40B4-BE49-F238E27FC236}">
+                <a16:creationId xmlns:a16="http://schemas.microsoft.com/office/drawing/2014/main" id="{E014D017-3F5D-E9D6-99EC-0EAB748C0697}"/>
+              </a:ext>
+            </a:extLst>
+          </p:cNvPr>
+          <p:cNvPicPr>
+            <a:picLocks noChangeAspect="1"/>
+          </p:cNvPicPr>
+          <p:nvPr/>
+        </p:nvPicPr>
+        <p:blipFill>
+          <a:blip r:embed="rId9"/>
+          <a:stretch>
+            <a:fillRect/>
+          </a:stretch>
+        </p:blipFill>
+        <p:spPr>
+          <a:xfrm>
+            <a:off x="7896163" y="2788614"/>
+            <a:ext cx="462142" cy="462142"/>
+          </a:xfrm>
+          <a:prstGeom prst="rect">
+            <a:avLst/>
+          </a:prstGeom>
+        </p:spPr>
+      </p:pic>
+      <p:sp>
+        <p:nvSpPr>
+          <p:cNvPr id="31" name="제목 1">
+            <a:extLst>
+              <a:ext uri="{FF2B5EF4-FFF2-40B4-BE49-F238E27FC236}">
+                <a16:creationId xmlns:a16="http://schemas.microsoft.com/office/drawing/2014/main" id="{B68F8371-67DD-46F1-CFB7-A708C5740D02}"/>
+              </a:ext>
+            </a:extLst>
+          </p:cNvPr>
+          <p:cNvSpPr txBox="1">
+            <a:spLocks/>
+          </p:cNvSpPr>
+          <p:nvPr/>
+        </p:nvSpPr>
+        <p:spPr>
+          <a:xfrm>
+            <a:off x="7669737" y="3260116"/>
+            <a:ext cx="967879" cy="267998"/>
+          </a:xfrm>
+          <a:prstGeom prst="rect">
+            <a:avLst/>
+          </a:prstGeom>
+        </p:spPr>
+        <p:txBody>
+          <a:bodyPr vert="horz" lIns="91440" tIns="45720" rIns="91440" bIns="45720" rtlCol="0" anchor="ctr">
+            <a:normAutofit/>
+          </a:bodyPr>
+          <a:lstStyle>
+            <a:lvl1pPr algn="l" defTabSz="914400" rtl="0" eaLnBrk="1" latinLnBrk="1" hangingPunct="1">
+              <a:lnSpc>
+                <a:spcPct val="90000"/>
+              </a:lnSpc>
+              <a:spcBef>
+                <a:spcPct val="0"/>
+              </a:spcBef>
+              <a:buNone/>
+              <a:defRPr sz="4400" kern="1200">
+                <a:solidFill>
+                  <a:schemeClr val="tx1"/>
+                </a:solidFill>
+                <a:latin typeface="+mj-lt"/>
+                <a:ea typeface="+mj-ea"/>
+                <a:cs typeface="+mj-cs"/>
+              </a:defRPr>
+            </a:lvl1pPr>
+          </a:lstStyle>
+          <a:p>
+            <a:pPr algn="ctr"/>
+            <a:r>
+              <a:rPr kumimoji="1" lang="en-US" altLang="ko-KR" sz="1100" b="1" dirty="0">
+                <a:latin typeface="KoPubWorldDotum Bold" pitchFamily="2" charset="-127"/>
+                <a:ea typeface="KoPubWorldDotum Bold" pitchFamily="2" charset="-127"/>
+                <a:cs typeface="KoPubWorldDotum Bold" pitchFamily="2" charset="-127"/>
+              </a:rPr>
+              <a:t>S3</a:t>
+            </a:r>
+            <a:endParaRPr kumimoji="1" lang="ko-KR" altLang="en-US" sz="1100" b="1" dirty="0">
+              <a:latin typeface="KoPubWorldDotum Bold" pitchFamily="2" charset="-127"/>
+              <a:ea typeface="KoPubWorldDotum Bold" pitchFamily="2" charset="-127"/>
+              <a:cs typeface="KoPubWorldDotum Bold" pitchFamily="2" charset="-127"/>
+            </a:endParaRPr>
+          </a:p>
+        </p:txBody>
+      </p:sp>
+      <p:cxnSp>
+        <p:nvCxnSpPr>
+          <p:cNvPr id="32" name="직선 화살표 연결선 31">
+            <a:extLst>
+              <a:ext uri="{FF2B5EF4-FFF2-40B4-BE49-F238E27FC236}">
+                <a16:creationId xmlns:a16="http://schemas.microsoft.com/office/drawing/2014/main" id="{9C4C48DA-AB9C-66CF-5BC3-E8C3AB5FEC45}"/>
+              </a:ext>
+            </a:extLst>
+          </p:cNvPr>
+          <p:cNvCxnSpPr>
+            <a:cxnSpLocks/>
+            <a:endCxn id="39" idx="3"/>
+          </p:cNvCxnSpPr>
+          <p:nvPr/>
+        </p:nvCxnSpPr>
+        <p:spPr>
+          <a:xfrm flipH="1" flipV="1">
+            <a:off x="10531069" y="2365402"/>
+            <a:ext cx="859521" cy="749"/>
+          </a:xfrm>
+          <a:prstGeom prst="straightConnector1">
+            <a:avLst/>
+          </a:prstGeom>
+          <a:ln>
+            <a:headEnd type="none" w="med" len="med"/>
+            <a:tailEnd type="none" w="med" len="med"/>
+          </a:ln>
+        </p:spPr>
+        <p:style>
+          <a:lnRef idx="2">
+            <a:schemeClr val="accent1"/>
+          </a:lnRef>
+          <a:fillRef idx="0">
+            <a:schemeClr val="accent1"/>
+          </a:fillRef>
+          <a:effectRef idx="1">
+            <a:schemeClr val="accent1"/>
+          </a:effectRef>
+          <a:fontRef idx="minor">
+            <a:schemeClr val="tx1"/>
+          </a:fontRef>
+        </p:style>
+      </p:cxnSp>
+      <p:pic>
+        <p:nvPicPr>
+          <p:cNvPr id="33" name="그림 32">
+            <a:extLst>
+              <a:ext uri="{FF2B5EF4-FFF2-40B4-BE49-F238E27FC236}">
+                <a16:creationId xmlns:a16="http://schemas.microsoft.com/office/drawing/2014/main" id="{299B75B5-D8F0-18BC-D6BE-E676585A616C}"/>
+              </a:ext>
+            </a:extLst>
+          </p:cNvPr>
+          <p:cNvPicPr>
+            <a:picLocks noChangeAspect="1"/>
+          </p:cNvPicPr>
+          <p:nvPr/>
+        </p:nvPicPr>
+        <p:blipFill>
+          <a:blip r:embed="rId10">
+            <a:alphaModFix amt="35000"/>
+          </a:blip>
+          <a:stretch>
+            <a:fillRect/>
+          </a:stretch>
+        </p:blipFill>
+        <p:spPr>
+          <a:xfrm>
+            <a:off x="6581429" y="2164801"/>
+            <a:ext cx="435116" cy="435116"/>
+          </a:xfrm>
+          <a:prstGeom prst="rect">
+            <a:avLst/>
+          </a:prstGeom>
+        </p:spPr>
+      </p:pic>
+      <p:sp>
+        <p:nvSpPr>
+          <p:cNvPr id="37" name="제목 1">
+            <a:extLst>
+              <a:ext uri="{FF2B5EF4-FFF2-40B4-BE49-F238E27FC236}">
+                <a16:creationId xmlns:a16="http://schemas.microsoft.com/office/drawing/2014/main" id="{4883C4EB-69F2-7707-5907-D402594B4B41}"/>
+              </a:ext>
+            </a:extLst>
+          </p:cNvPr>
+          <p:cNvSpPr txBox="1">
+            <a:spLocks/>
+          </p:cNvSpPr>
+          <p:nvPr/>
+        </p:nvSpPr>
+        <p:spPr>
+          <a:xfrm>
+            <a:off x="6312345" y="2668250"/>
+            <a:ext cx="967879" cy="267998"/>
+          </a:xfrm>
+          <a:prstGeom prst="rect">
+            <a:avLst/>
+          </a:prstGeom>
+        </p:spPr>
+        <p:txBody>
+          <a:bodyPr vert="horz" lIns="91440" tIns="45720" rIns="91440" bIns="45720" rtlCol="0" anchor="ctr">
+            <a:normAutofit/>
+          </a:bodyPr>
+          <a:lstStyle>
+            <a:lvl1pPr algn="l" defTabSz="914400" rtl="0" eaLnBrk="1" latinLnBrk="1" hangingPunct="1">
+              <a:lnSpc>
+                <a:spcPct val="90000"/>
+              </a:lnSpc>
+              <a:spcBef>
+                <a:spcPct val="0"/>
+              </a:spcBef>
+              <a:buNone/>
+              <a:defRPr sz="4400" kern="1200">
+                <a:solidFill>
+                  <a:schemeClr val="tx1"/>
+                </a:solidFill>
+                <a:latin typeface="+mj-lt"/>
+                <a:ea typeface="+mj-ea"/>
+                <a:cs typeface="+mj-cs"/>
+              </a:defRPr>
+            </a:lvl1pPr>
+          </a:lstStyle>
+          <a:p>
+            <a:pPr algn="ctr"/>
+            <a:r>
+              <a:rPr kumimoji="1" lang="en-US" altLang="ko-KR" sz="1100" b="1" dirty="0">
+                <a:latin typeface="KoPubWorldDotum Bold" pitchFamily="2" charset="-127"/>
+                <a:ea typeface="KoPubWorldDotum Bold" pitchFamily="2" charset="-127"/>
+                <a:cs typeface="KoPubWorldDotum Bold" pitchFamily="2" charset="-127"/>
+              </a:rPr>
+              <a:t>CloudFront</a:t>
+            </a:r>
+            <a:endParaRPr kumimoji="1" lang="ko-KR" altLang="en-US" sz="1100" b="1" dirty="0">
+              <a:latin typeface="KoPubWorldDotum Bold" pitchFamily="2" charset="-127"/>
+              <a:ea typeface="KoPubWorldDotum Bold" pitchFamily="2" charset="-127"/>
+              <a:cs typeface="KoPubWorldDotum Bold" pitchFamily="2" charset="-127"/>
+            </a:endParaRPr>
+          </a:p>
+        </p:txBody>
+      </p:sp>
+      <p:pic>
+        <p:nvPicPr>
+          <p:cNvPr id="38" name="그래픽 37" descr="사용자 단색으로 채워진">
+            <a:extLst>
+              <a:ext uri="{FF2B5EF4-FFF2-40B4-BE49-F238E27FC236}">
+                <a16:creationId xmlns:a16="http://schemas.microsoft.com/office/drawing/2014/main" id="{3CCFFB7A-B116-AF77-980D-C90D7C5B0E09}"/>
+              </a:ext>
+            </a:extLst>
+          </p:cNvPr>
+          <p:cNvPicPr>
+            <a:picLocks noChangeAspect="1"/>
+          </p:cNvPicPr>
+          <p:nvPr/>
+        </p:nvPicPr>
+        <p:blipFill>
+          <a:blip r:embed="rId11">
+            <a:extLst>
+              <a:ext uri="{96DAC541-7B7A-43D3-8B79-37D633B846F1}">
+                <asvg:svgBlip xmlns:asvg="http://schemas.microsoft.com/office/drawing/2016/SVG/main" r:embed="rId12"/>
+              </a:ext>
+            </a:extLst>
+          </a:blip>
+          <a:stretch>
+            <a:fillRect/>
+          </a:stretch>
+        </p:blipFill>
+        <p:spPr>
+          <a:xfrm>
+            <a:off x="11069435" y="1923153"/>
+            <a:ext cx="754027" cy="754027"/>
+          </a:xfrm>
+          <a:prstGeom prst="rect">
+            <a:avLst/>
+          </a:prstGeom>
+        </p:spPr>
+      </p:pic>
+      <p:pic>
+        <p:nvPicPr>
+          <p:cNvPr id="39" name="그림 38">
+            <a:extLst>
+              <a:ext uri="{FF2B5EF4-FFF2-40B4-BE49-F238E27FC236}">
+                <a16:creationId xmlns:a16="http://schemas.microsoft.com/office/drawing/2014/main" id="{4ECCA4A3-4896-020A-6E1B-A5C0CABA7AB0}"/>
+              </a:ext>
+            </a:extLst>
+          </p:cNvPr>
+          <p:cNvPicPr>
+            <a:picLocks noChangeAspect="1"/>
+          </p:cNvPicPr>
+          <p:nvPr/>
+        </p:nvPicPr>
+        <p:blipFill>
+          <a:blip r:embed="rId13">
+            <a:alphaModFix amt="35000"/>
+          </a:blip>
+          <a:stretch>
+            <a:fillRect/>
+          </a:stretch>
+        </p:blipFill>
+        <p:spPr>
+          <a:xfrm>
+            <a:off x="10061669" y="2130702"/>
+            <a:ext cx="469400" cy="469400"/>
+          </a:xfrm>
+          <a:prstGeom prst="rect">
+            <a:avLst/>
+          </a:prstGeom>
+        </p:spPr>
+      </p:pic>
+      <p:sp>
+        <p:nvSpPr>
+          <p:cNvPr id="40" name="제목 1">
+            <a:extLst>
+              <a:ext uri="{FF2B5EF4-FFF2-40B4-BE49-F238E27FC236}">
+                <a16:creationId xmlns:a16="http://schemas.microsoft.com/office/drawing/2014/main" id="{D265A0A2-EE38-19E6-4AB8-846CED18BE20}"/>
+              </a:ext>
+            </a:extLst>
+          </p:cNvPr>
+          <p:cNvSpPr txBox="1">
+            <a:spLocks/>
+          </p:cNvSpPr>
+          <p:nvPr/>
+        </p:nvSpPr>
+        <p:spPr>
+          <a:xfrm>
+            <a:off x="9808138" y="2600102"/>
+            <a:ext cx="967879" cy="267998"/>
+          </a:xfrm>
+          <a:prstGeom prst="rect">
+            <a:avLst/>
+          </a:prstGeom>
+        </p:spPr>
+        <p:txBody>
+          <a:bodyPr vert="horz" lIns="91440" tIns="45720" rIns="91440" bIns="45720" rtlCol="0" anchor="ctr">
+            <a:normAutofit/>
+          </a:bodyPr>
+          <a:lstStyle>
+            <a:lvl1pPr algn="l" defTabSz="914400" rtl="0" eaLnBrk="1" latinLnBrk="1" hangingPunct="1">
+              <a:lnSpc>
+                <a:spcPct val="90000"/>
+              </a:lnSpc>
+              <a:spcBef>
+                <a:spcPct val="0"/>
+              </a:spcBef>
+              <a:buNone/>
+              <a:defRPr sz="4400" kern="1200">
+                <a:solidFill>
+                  <a:schemeClr val="tx1"/>
+                </a:solidFill>
+                <a:latin typeface="+mj-lt"/>
+                <a:ea typeface="+mj-ea"/>
+                <a:cs typeface="+mj-cs"/>
+              </a:defRPr>
+            </a:lvl1pPr>
+          </a:lstStyle>
+          <a:p>
+            <a:pPr algn="ctr"/>
+            <a:r>
+              <a:rPr kumimoji="1" lang="en-US" altLang="ko-KR" sz="1100" b="1" dirty="0">
+                <a:latin typeface="KoPubWorldDotum Bold" pitchFamily="2" charset="-127"/>
+                <a:ea typeface="KoPubWorldDotum Bold" pitchFamily="2" charset="-127"/>
+                <a:cs typeface="KoPubWorldDotum Bold" pitchFamily="2" charset="-127"/>
+              </a:rPr>
+              <a:t>Route 53</a:t>
+            </a:r>
+            <a:endParaRPr kumimoji="1" lang="ko-KR" altLang="en-US" sz="1100" b="1" dirty="0">
+              <a:latin typeface="KoPubWorldDotum Bold" pitchFamily="2" charset="-127"/>
+              <a:ea typeface="KoPubWorldDotum Bold" pitchFamily="2" charset="-127"/>
+              <a:cs typeface="KoPubWorldDotum Bold" pitchFamily="2" charset="-127"/>
+            </a:endParaRPr>
+          </a:p>
+        </p:txBody>
+      </p:sp>
+      <p:sp>
+        <p:nvSpPr>
+          <p:cNvPr id="41" name="처리 40">
+            <a:extLst>
+              <a:ext uri="{FF2B5EF4-FFF2-40B4-BE49-F238E27FC236}">
+                <a16:creationId xmlns:a16="http://schemas.microsoft.com/office/drawing/2014/main" id="{3696A90F-8B52-3CF7-5BAE-40A3644A9762}"/>
+              </a:ext>
+            </a:extLst>
+          </p:cNvPr>
+          <p:cNvSpPr/>
+          <p:nvPr/>
+        </p:nvSpPr>
+        <p:spPr>
+          <a:xfrm>
+            <a:off x="7502416" y="1996940"/>
+            <a:ext cx="1203109" cy="243942"/>
+          </a:xfrm>
+          <a:prstGeom prst="flowChartProcess">
+            <a:avLst/>
+          </a:prstGeom>
+          <a:solidFill>
+            <a:schemeClr val="accent1"/>
+          </a:solidFill>
+          <a:ln>
+            <a:noFill/>
+          </a:ln>
+        </p:spPr>
+        <p:style>
+          <a:lnRef idx="2">
+            <a:schemeClr val="accent1">
+              <a:shade val="15000"/>
+            </a:schemeClr>
+          </a:lnRef>
+          <a:fillRef idx="1">
+            <a:schemeClr val="accent1"/>
+          </a:fillRef>
+          <a:effectRef idx="0">
+            <a:schemeClr val="accent1"/>
+          </a:effectRef>
+          <a:fontRef idx="minor">
+            <a:schemeClr val="lt1"/>
+          </a:fontRef>
+        </p:style>
+        <p:txBody>
+          <a:bodyPr rtlCol="0" anchor="ctr"/>
+          <a:lstStyle/>
+          <a:p>
+            <a:pPr algn="ctr"/>
+            <a:r>
+              <a:rPr kumimoji="1" lang="en-US" altLang="ko-KR" sz="1100" b="1" dirty="0" err="1">
+                <a:latin typeface="KoPubWorldDotum Bold" pitchFamily="2" charset="-127"/>
+                <a:ea typeface="KoPubWorldDotum Bold" pitchFamily="2" charset="-127"/>
+                <a:cs typeface="KoPubWorldDotum Bold" pitchFamily="2" charset="-127"/>
+              </a:rPr>
+              <a:t>Front.js</a:t>
+            </a:r>
+            <a:endParaRPr kumimoji="1" lang="ko-KR" altLang="en-US" sz="1100" b="1" dirty="0">
+              <a:latin typeface="KoPubWorldDotum Bold" pitchFamily="2" charset="-127"/>
+              <a:ea typeface="KoPubWorldDotum Bold" pitchFamily="2" charset="-127"/>
+              <a:cs typeface="KoPubWorldDotum Bold" pitchFamily="2" charset="-127"/>
+            </a:endParaRPr>
+          </a:p>
+        </p:txBody>
+      </p:sp>
+      <p:sp>
+        <p:nvSpPr>
+          <p:cNvPr id="42" name="처리 41">
+            <a:extLst>
+              <a:ext uri="{FF2B5EF4-FFF2-40B4-BE49-F238E27FC236}">
+                <a16:creationId xmlns:a16="http://schemas.microsoft.com/office/drawing/2014/main" id="{CCF6BED8-D135-AFA2-9027-2049A89CFE2B}"/>
+              </a:ext>
+            </a:extLst>
+          </p:cNvPr>
+          <p:cNvSpPr/>
+          <p:nvPr/>
+        </p:nvSpPr>
+        <p:spPr>
+          <a:xfrm>
+            <a:off x="7502416" y="2256906"/>
+            <a:ext cx="1203109" cy="243942"/>
+          </a:xfrm>
+          <a:prstGeom prst="flowChartProcess">
+            <a:avLst/>
+          </a:prstGeom>
+          <a:solidFill>
+            <a:schemeClr val="accent1"/>
+          </a:solidFill>
+          <a:ln>
+            <a:noFill/>
+          </a:ln>
+        </p:spPr>
+        <p:style>
+          <a:lnRef idx="2">
+            <a:schemeClr val="accent1">
+              <a:shade val="15000"/>
+            </a:schemeClr>
+          </a:lnRef>
+          <a:fillRef idx="1">
+            <a:schemeClr val="accent1"/>
+          </a:fillRef>
+          <a:effectRef idx="0">
+            <a:schemeClr val="accent1"/>
+          </a:effectRef>
+          <a:fontRef idx="minor">
+            <a:schemeClr val="lt1"/>
+          </a:fontRef>
+        </p:style>
+        <p:txBody>
+          <a:bodyPr rtlCol="0" anchor="ctr"/>
+          <a:lstStyle/>
+          <a:p>
+            <a:pPr algn="ctr"/>
+            <a:r>
+              <a:rPr kumimoji="1" lang="en-US" altLang="ko-KR" sz="1100" b="1" dirty="0" err="1">
+                <a:latin typeface="KoPubWorldDotum Bold" pitchFamily="2" charset="-127"/>
+                <a:ea typeface="KoPubWorldDotum Bold" pitchFamily="2" charset="-127"/>
+                <a:cs typeface="KoPubWorldDotum Bold" pitchFamily="2" charset="-127"/>
+              </a:rPr>
+              <a:t>Front.html</a:t>
+            </a:r>
+            <a:endParaRPr kumimoji="1" lang="ko-KR" altLang="en-US" sz="1100" b="1" dirty="0">
+              <a:latin typeface="KoPubWorldDotum Bold" pitchFamily="2" charset="-127"/>
+              <a:ea typeface="KoPubWorldDotum Bold" pitchFamily="2" charset="-127"/>
+              <a:cs typeface="KoPubWorldDotum Bold" pitchFamily="2" charset="-127"/>
+            </a:endParaRPr>
+          </a:p>
+        </p:txBody>
+      </p:sp>
+      <p:sp>
+        <p:nvSpPr>
+          <p:cNvPr id="44" name="처리 43">
+            <a:extLst>
+              <a:ext uri="{FF2B5EF4-FFF2-40B4-BE49-F238E27FC236}">
+                <a16:creationId xmlns:a16="http://schemas.microsoft.com/office/drawing/2014/main" id="{26C1842D-826B-A14B-203C-E628EB699989}"/>
+              </a:ext>
+            </a:extLst>
+          </p:cNvPr>
+          <p:cNvSpPr/>
+          <p:nvPr/>
+        </p:nvSpPr>
+        <p:spPr>
+          <a:xfrm>
+            <a:off x="7502416" y="2519734"/>
+            <a:ext cx="1203109" cy="243942"/>
+          </a:xfrm>
+          <a:prstGeom prst="flowChartProcess">
+            <a:avLst/>
+          </a:prstGeom>
+          <a:solidFill>
+            <a:srgbClr val="156082">
+              <a:alpha val="35294"/>
+            </a:srgbClr>
+          </a:solidFill>
+          <a:ln>
+            <a:noFill/>
+          </a:ln>
+        </p:spPr>
+        <p:style>
+          <a:lnRef idx="2">
+            <a:schemeClr val="accent1">
+              <a:shade val="15000"/>
+            </a:schemeClr>
+          </a:lnRef>
+          <a:fillRef idx="1">
+            <a:schemeClr val="accent1"/>
+          </a:fillRef>
+          <a:effectRef idx="0">
+            <a:schemeClr val="accent1"/>
+          </a:effectRef>
+          <a:fontRef idx="minor">
+            <a:schemeClr val="lt1"/>
+          </a:fontRef>
+        </p:style>
+        <p:txBody>
+          <a:bodyPr rtlCol="0" anchor="ctr"/>
+          <a:lstStyle/>
+          <a:p>
+            <a:pPr algn="ctr"/>
+            <a:r>
+              <a:rPr kumimoji="1" lang="en-US" altLang="ko-KR" sz="1100" b="1" dirty="0" err="1">
+                <a:latin typeface="KoPubWorldDotum Bold" pitchFamily="2" charset="-127"/>
+                <a:ea typeface="KoPubWorldDotum Bold" pitchFamily="2" charset="-127"/>
+                <a:cs typeface="KoPubWorldDotum Bold" pitchFamily="2" charset="-127"/>
+              </a:rPr>
+              <a:t>Front.css</a:t>
+            </a:r>
+            <a:endParaRPr kumimoji="1" lang="ko-KR" altLang="en-US" sz="1100" b="1" dirty="0">
+              <a:latin typeface="KoPubWorldDotum Bold" pitchFamily="2" charset="-127"/>
+              <a:ea typeface="KoPubWorldDotum Bold" pitchFamily="2" charset="-127"/>
+              <a:cs typeface="KoPubWorldDotum Bold" pitchFamily="2" charset="-127"/>
+            </a:endParaRPr>
+          </a:p>
+        </p:txBody>
+      </p:sp>
+      <p:pic>
+        <p:nvPicPr>
+          <p:cNvPr id="45" name="그림 44">
+            <a:extLst>
+              <a:ext uri="{FF2B5EF4-FFF2-40B4-BE49-F238E27FC236}">
+                <a16:creationId xmlns:a16="http://schemas.microsoft.com/office/drawing/2014/main" id="{371D1B9E-F9A5-B818-0A2D-56C3F74432FB}"/>
+              </a:ext>
+            </a:extLst>
+          </p:cNvPr>
+          <p:cNvPicPr>
+            <a:picLocks noChangeAspect="1"/>
+          </p:cNvPicPr>
+          <p:nvPr/>
+        </p:nvPicPr>
+        <p:blipFill>
+          <a:blip r:embed="rId14">
+            <a:alphaModFix amt="35000"/>
+          </a:blip>
+          <a:stretch>
+            <a:fillRect/>
+          </a:stretch>
+        </p:blipFill>
+        <p:spPr>
+          <a:xfrm>
+            <a:off x="9214494" y="2134070"/>
+            <a:ext cx="458939" cy="458939"/>
+          </a:xfrm>
+          <a:prstGeom prst="rect">
+            <a:avLst/>
+          </a:prstGeom>
+        </p:spPr>
+      </p:pic>
+      <p:sp>
+        <p:nvSpPr>
+          <p:cNvPr id="47" name="제목 1">
+            <a:extLst>
+              <a:ext uri="{FF2B5EF4-FFF2-40B4-BE49-F238E27FC236}">
+                <a16:creationId xmlns:a16="http://schemas.microsoft.com/office/drawing/2014/main" id="{366394CA-2055-4338-75FA-29FAE3468C72}"/>
+              </a:ext>
+            </a:extLst>
+          </p:cNvPr>
+          <p:cNvSpPr txBox="1">
+            <a:spLocks/>
+          </p:cNvSpPr>
+          <p:nvPr/>
+        </p:nvSpPr>
+        <p:spPr>
+          <a:xfrm>
+            <a:off x="8954681" y="2600102"/>
+            <a:ext cx="967879" cy="267998"/>
+          </a:xfrm>
+          <a:prstGeom prst="rect">
+            <a:avLst/>
+          </a:prstGeom>
+        </p:spPr>
+        <p:txBody>
+          <a:bodyPr vert="horz" lIns="91440" tIns="45720" rIns="91440" bIns="45720" rtlCol="0" anchor="ctr">
+            <a:normAutofit/>
+          </a:bodyPr>
+          <a:lstStyle>
+            <a:lvl1pPr algn="l" defTabSz="914400" rtl="0" eaLnBrk="1" latinLnBrk="1" hangingPunct="1">
+              <a:lnSpc>
+                <a:spcPct val="90000"/>
+              </a:lnSpc>
+              <a:spcBef>
+                <a:spcPct val="0"/>
+              </a:spcBef>
+              <a:buNone/>
+              <a:defRPr sz="4400" kern="1200">
+                <a:solidFill>
+                  <a:schemeClr val="tx1"/>
+                </a:solidFill>
+                <a:latin typeface="+mj-lt"/>
+                <a:ea typeface="+mj-ea"/>
+                <a:cs typeface="+mj-cs"/>
+              </a:defRPr>
+            </a:lvl1pPr>
+          </a:lstStyle>
+          <a:p>
+            <a:pPr algn="ctr"/>
+            <a:r>
+              <a:rPr kumimoji="1" lang="en-US" altLang="ko-KR" sz="1100" b="1" dirty="0">
+                <a:latin typeface="KoPubWorldDotum Bold" pitchFamily="2" charset="-127"/>
+                <a:ea typeface="KoPubWorldDotum Bold" pitchFamily="2" charset="-127"/>
+                <a:cs typeface="KoPubWorldDotum Bold" pitchFamily="2" charset="-127"/>
+              </a:rPr>
+              <a:t>WAF</a:t>
+            </a:r>
+            <a:endParaRPr kumimoji="1" lang="ko-KR" altLang="en-US" sz="1100" b="1" dirty="0">
+              <a:latin typeface="KoPubWorldDotum Bold" pitchFamily="2" charset="-127"/>
+              <a:ea typeface="KoPubWorldDotum Bold" pitchFamily="2" charset="-127"/>
+              <a:cs typeface="KoPubWorldDotum Bold" pitchFamily="2" charset="-127"/>
+            </a:endParaRPr>
+          </a:p>
+        </p:txBody>
+      </p:sp>
+      <p:sp>
+        <p:nvSpPr>
+          <p:cNvPr id="48" name="제목 1">
+            <a:extLst>
+              <a:ext uri="{FF2B5EF4-FFF2-40B4-BE49-F238E27FC236}">
+                <a16:creationId xmlns:a16="http://schemas.microsoft.com/office/drawing/2014/main" id="{6666B4EF-DAA2-18A1-C3FB-6AA06B52EA62}"/>
+              </a:ext>
+            </a:extLst>
+          </p:cNvPr>
+          <p:cNvSpPr txBox="1">
+            <a:spLocks/>
+          </p:cNvSpPr>
+          <p:nvPr/>
+        </p:nvSpPr>
+        <p:spPr>
+          <a:xfrm>
+            <a:off x="5451168" y="2668250"/>
+            <a:ext cx="967879" cy="267998"/>
+          </a:xfrm>
+          <a:prstGeom prst="rect">
+            <a:avLst/>
+          </a:prstGeom>
+        </p:spPr>
+        <p:txBody>
+          <a:bodyPr vert="horz" lIns="91440" tIns="45720" rIns="91440" bIns="45720" rtlCol="0" anchor="ctr">
+            <a:normAutofit fontScale="92500"/>
+          </a:bodyPr>
+          <a:lstStyle>
+            <a:lvl1pPr algn="l" defTabSz="914400" rtl="0" eaLnBrk="1" latinLnBrk="1" hangingPunct="1">
+              <a:lnSpc>
+                <a:spcPct val="90000"/>
+              </a:lnSpc>
+              <a:spcBef>
+                <a:spcPct val="0"/>
+              </a:spcBef>
+              <a:buNone/>
+              <a:defRPr sz="4400" kern="1200">
+                <a:solidFill>
+                  <a:schemeClr val="tx1"/>
+                </a:solidFill>
+                <a:latin typeface="+mj-lt"/>
+                <a:ea typeface="+mj-ea"/>
+                <a:cs typeface="+mj-cs"/>
+              </a:defRPr>
+            </a:lvl1pPr>
+          </a:lstStyle>
+          <a:p>
+            <a:pPr algn="ctr"/>
+            <a:r>
+              <a:rPr kumimoji="1" lang="en-US" altLang="ko-KR" sz="1100" b="1" dirty="0">
+                <a:latin typeface="KoPubWorldDotum Bold" pitchFamily="2" charset="-127"/>
+                <a:ea typeface="KoPubWorldDotum Bold" pitchFamily="2" charset="-127"/>
+                <a:cs typeface="KoPubWorldDotum Bold" pitchFamily="2" charset="-127"/>
+              </a:rPr>
+              <a:t>API Gateway</a:t>
+            </a:r>
+            <a:endParaRPr kumimoji="1" lang="ko-KR" altLang="en-US" sz="1100" b="1" dirty="0">
+              <a:latin typeface="KoPubWorldDotum Bold" pitchFamily="2" charset="-127"/>
+              <a:ea typeface="KoPubWorldDotum Bold" pitchFamily="2" charset="-127"/>
+              <a:cs typeface="KoPubWorldDotum Bold" pitchFamily="2" charset="-127"/>
+            </a:endParaRPr>
+          </a:p>
+        </p:txBody>
+      </p:sp>
+      <p:sp>
+        <p:nvSpPr>
+          <p:cNvPr id="52" name="제목 1">
+            <a:extLst>
+              <a:ext uri="{FF2B5EF4-FFF2-40B4-BE49-F238E27FC236}">
+                <a16:creationId xmlns:a16="http://schemas.microsoft.com/office/drawing/2014/main" id="{E9F17F88-4DCB-803E-4479-A1146811AEB5}"/>
+              </a:ext>
+            </a:extLst>
+          </p:cNvPr>
+          <p:cNvSpPr txBox="1">
+            <a:spLocks/>
+          </p:cNvSpPr>
+          <p:nvPr/>
+        </p:nvSpPr>
+        <p:spPr>
+          <a:xfrm>
+            <a:off x="3597858" y="4781030"/>
+            <a:ext cx="967879" cy="267998"/>
+          </a:xfrm>
+          <a:prstGeom prst="rect">
+            <a:avLst/>
+          </a:prstGeom>
+        </p:spPr>
+        <p:txBody>
+          <a:bodyPr vert="horz" lIns="91440" tIns="45720" rIns="91440" bIns="45720" rtlCol="0" anchor="ctr">
+            <a:normAutofit/>
+          </a:bodyPr>
+          <a:lstStyle>
+            <a:lvl1pPr algn="l" defTabSz="914400" rtl="0" eaLnBrk="1" latinLnBrk="1" hangingPunct="1">
+              <a:lnSpc>
+                <a:spcPct val="90000"/>
+              </a:lnSpc>
+              <a:spcBef>
+                <a:spcPct val="0"/>
+              </a:spcBef>
+              <a:buNone/>
+              <a:defRPr sz="4400" kern="1200">
+                <a:solidFill>
+                  <a:schemeClr val="tx1"/>
+                </a:solidFill>
+                <a:latin typeface="+mj-lt"/>
+                <a:ea typeface="+mj-ea"/>
+                <a:cs typeface="+mj-cs"/>
+              </a:defRPr>
+            </a:lvl1pPr>
+          </a:lstStyle>
+          <a:p>
+            <a:pPr algn="ctr"/>
+            <a:r>
+              <a:rPr kumimoji="1" lang="en-US" altLang="ko-KR" sz="1100" b="1" dirty="0" err="1">
+                <a:latin typeface="KoPubWorldDotum Bold" pitchFamily="2" charset="-127"/>
+                <a:ea typeface="KoPubWorldDotum Bold" pitchFamily="2" charset="-127"/>
+                <a:cs typeface="KoPubWorldDotum Bold" pitchFamily="2" charset="-127"/>
+              </a:rPr>
+              <a:t>Cloudwatch</a:t>
+            </a:r>
+            <a:endParaRPr kumimoji="1" lang="ko-KR" altLang="en-US" sz="1100" b="1" dirty="0">
+              <a:latin typeface="KoPubWorldDotum Bold" pitchFamily="2" charset="-127"/>
+              <a:ea typeface="KoPubWorldDotum Bold" pitchFamily="2" charset="-127"/>
+              <a:cs typeface="KoPubWorldDotum Bold" pitchFamily="2" charset="-127"/>
+            </a:endParaRPr>
+          </a:p>
+        </p:txBody>
+      </p:sp>
+      <p:pic>
+        <p:nvPicPr>
+          <p:cNvPr id="53" name="그림 52">
+            <a:extLst>
+              <a:ext uri="{FF2B5EF4-FFF2-40B4-BE49-F238E27FC236}">
+                <a16:creationId xmlns:a16="http://schemas.microsoft.com/office/drawing/2014/main" id="{2553ADDA-AB0D-A775-5972-34D82429DC78}"/>
+              </a:ext>
+            </a:extLst>
+          </p:cNvPr>
+          <p:cNvPicPr>
+            <a:picLocks noChangeAspect="1"/>
+          </p:cNvPicPr>
+          <p:nvPr/>
+        </p:nvPicPr>
+        <p:blipFill>
+          <a:blip r:embed="rId15">
+            <a:alphaModFix amt="35000"/>
+          </a:blip>
+          <a:stretch>
+            <a:fillRect/>
+          </a:stretch>
+        </p:blipFill>
+        <p:spPr>
+          <a:xfrm>
+            <a:off x="3287021" y="3402268"/>
+            <a:ext cx="462143" cy="462143"/>
+          </a:xfrm>
+          <a:prstGeom prst="rect">
+            <a:avLst/>
+          </a:prstGeom>
+        </p:spPr>
+      </p:pic>
+      <p:sp>
+        <p:nvSpPr>
+          <p:cNvPr id="59" name="제목 1">
+            <a:extLst>
+              <a:ext uri="{FF2B5EF4-FFF2-40B4-BE49-F238E27FC236}">
+                <a16:creationId xmlns:a16="http://schemas.microsoft.com/office/drawing/2014/main" id="{136BCF7D-BE45-1249-0A36-AE08D869C09D}"/>
+              </a:ext>
+            </a:extLst>
+          </p:cNvPr>
+          <p:cNvSpPr txBox="1">
+            <a:spLocks/>
+          </p:cNvSpPr>
+          <p:nvPr/>
+        </p:nvSpPr>
+        <p:spPr>
+          <a:xfrm>
+            <a:off x="3160461" y="3828437"/>
+            <a:ext cx="739201" cy="267998"/>
+          </a:xfrm>
+          <a:prstGeom prst="rect">
+            <a:avLst/>
+          </a:prstGeom>
+        </p:spPr>
+        <p:txBody>
+          <a:bodyPr vert="horz" lIns="91440" tIns="45720" rIns="91440" bIns="45720" rtlCol="0" anchor="ctr">
+            <a:normAutofit/>
+          </a:bodyPr>
+          <a:lstStyle>
+            <a:lvl1pPr algn="l" defTabSz="914400" rtl="0" eaLnBrk="1" latinLnBrk="1" hangingPunct="1">
+              <a:lnSpc>
+                <a:spcPct val="90000"/>
+              </a:lnSpc>
+              <a:spcBef>
+                <a:spcPct val="0"/>
+              </a:spcBef>
+              <a:buNone/>
+              <a:defRPr sz="4400" kern="1200">
+                <a:solidFill>
+                  <a:schemeClr val="tx1"/>
+                </a:solidFill>
+                <a:latin typeface="+mj-lt"/>
+                <a:ea typeface="+mj-ea"/>
+                <a:cs typeface="+mj-cs"/>
+              </a:defRPr>
+            </a:lvl1pPr>
+          </a:lstStyle>
+          <a:p>
+            <a:pPr algn="ctr"/>
+            <a:r>
+              <a:rPr kumimoji="1" lang="en-US" altLang="ko-KR" sz="1100" b="1" dirty="0">
+                <a:latin typeface="KoPubWorldDotum Bold" pitchFamily="2" charset="-127"/>
+                <a:ea typeface="KoPubWorldDotum Bold" pitchFamily="2" charset="-127"/>
+                <a:cs typeface="KoPubWorldDotum Bold" pitchFamily="2" charset="-127"/>
+              </a:rPr>
+              <a:t>Cognito</a:t>
+            </a:r>
+            <a:endParaRPr kumimoji="1" lang="ko-KR" altLang="en-US" sz="1100" b="1" dirty="0">
+              <a:latin typeface="KoPubWorldDotum Bold" pitchFamily="2" charset="-127"/>
+              <a:ea typeface="KoPubWorldDotum Bold" pitchFamily="2" charset="-127"/>
+              <a:cs typeface="KoPubWorldDotum Bold" pitchFamily="2" charset="-127"/>
+            </a:endParaRPr>
+          </a:p>
+        </p:txBody>
+      </p:sp>
+      <p:cxnSp>
+        <p:nvCxnSpPr>
+          <p:cNvPr id="23" name="꺾인 연결선[E] 22">
+            <a:extLst>
+              <a:ext uri="{FF2B5EF4-FFF2-40B4-BE49-F238E27FC236}">
+                <a16:creationId xmlns:a16="http://schemas.microsoft.com/office/drawing/2014/main" id="{98498933-D8AE-7764-4028-CB8700E0A259}"/>
+              </a:ext>
+            </a:extLst>
+          </p:cNvPr>
+          <p:cNvCxnSpPr>
+            <a:cxnSpLocks/>
+            <a:stCxn id="19" idx="2"/>
+            <a:endCxn id="63" idx="0"/>
+          </p:cNvCxnSpPr>
+          <p:nvPr/>
+        </p:nvCxnSpPr>
+        <p:spPr>
+          <a:xfrm rot="5400000">
+            <a:off x="4273376" y="3909905"/>
+            <a:ext cx="219321" cy="593145"/>
+          </a:xfrm>
+          <a:prstGeom prst="bentConnector3">
+            <a:avLst>
+              <a:gd name="adj1" fmla="val 50000"/>
+            </a:avLst>
+          </a:prstGeom>
+        </p:spPr>
+        <p:style>
+          <a:lnRef idx="2">
+            <a:schemeClr val="accent1"/>
+          </a:lnRef>
+          <a:fillRef idx="0">
+            <a:schemeClr val="accent1"/>
+          </a:fillRef>
+          <a:effectRef idx="1">
+            <a:schemeClr val="accent1"/>
+          </a:effectRef>
+          <a:fontRef idx="minor">
+            <a:schemeClr val="tx1"/>
+          </a:fontRef>
+        </p:style>
+      </p:cxnSp>
+      <p:cxnSp>
+        <p:nvCxnSpPr>
+          <p:cNvPr id="46" name="꺾인 연결선[E] 45">
+            <a:extLst>
+              <a:ext uri="{FF2B5EF4-FFF2-40B4-BE49-F238E27FC236}">
+                <a16:creationId xmlns:a16="http://schemas.microsoft.com/office/drawing/2014/main" id="{BD429807-1AD0-DB26-2768-B9EEEEA5DD42}"/>
+              </a:ext>
+            </a:extLst>
+          </p:cNvPr>
+          <p:cNvCxnSpPr>
+            <a:cxnSpLocks/>
+            <a:endCxn id="18" idx="0"/>
+          </p:cNvCxnSpPr>
+          <p:nvPr/>
+        </p:nvCxnSpPr>
+        <p:spPr>
+          <a:xfrm>
+            <a:off x="4267094" y="3198616"/>
+            <a:ext cx="423545" cy="203652"/>
+          </a:xfrm>
+          <a:prstGeom prst="bentConnector2">
+            <a:avLst/>
+          </a:prstGeom>
+        </p:spPr>
+        <p:style>
+          <a:lnRef idx="2">
+            <a:schemeClr val="accent1"/>
+          </a:lnRef>
+          <a:fillRef idx="0">
+            <a:schemeClr val="accent1"/>
+          </a:fillRef>
+          <a:effectRef idx="1">
+            <a:schemeClr val="accent1"/>
+          </a:effectRef>
+          <a:fontRef idx="minor">
+            <a:schemeClr val="tx1"/>
+          </a:fontRef>
+        </p:style>
+      </p:cxnSp>
+      <p:cxnSp>
+        <p:nvCxnSpPr>
+          <p:cNvPr id="55" name="꺾인 연결선[E] 54">
+            <a:extLst>
+              <a:ext uri="{FF2B5EF4-FFF2-40B4-BE49-F238E27FC236}">
+                <a16:creationId xmlns:a16="http://schemas.microsoft.com/office/drawing/2014/main" id="{13381958-D0AB-6C14-6478-BED70ACF6C92}"/>
+              </a:ext>
+            </a:extLst>
+          </p:cNvPr>
+          <p:cNvCxnSpPr>
+            <a:cxnSpLocks/>
+            <a:endCxn id="53" idx="0"/>
+          </p:cNvCxnSpPr>
+          <p:nvPr/>
+        </p:nvCxnSpPr>
+        <p:spPr>
+          <a:xfrm rot="10800000" flipV="1">
+            <a:off x="3518094" y="3179052"/>
+            <a:ext cx="353199" cy="223215"/>
+          </a:xfrm>
+          <a:prstGeom prst="bentConnector2">
+            <a:avLst/>
+          </a:prstGeom>
+        </p:spPr>
+        <p:style>
+          <a:lnRef idx="2">
+            <a:schemeClr val="accent1"/>
+          </a:lnRef>
+          <a:fillRef idx="0">
+            <a:schemeClr val="accent1"/>
+          </a:fillRef>
+          <a:effectRef idx="1">
+            <a:schemeClr val="accent1"/>
+          </a:effectRef>
+          <a:fontRef idx="minor">
+            <a:schemeClr val="tx1"/>
+          </a:fontRef>
+        </p:style>
+      </p:cxnSp>
+      <p:cxnSp>
+        <p:nvCxnSpPr>
+          <p:cNvPr id="1027" name="꺾인 연결선[E] 1026">
+            <a:extLst>
+              <a:ext uri="{FF2B5EF4-FFF2-40B4-BE49-F238E27FC236}">
+                <a16:creationId xmlns:a16="http://schemas.microsoft.com/office/drawing/2014/main" id="{135047B6-E1E0-79F6-B613-9B590C528682}"/>
+              </a:ext>
+            </a:extLst>
+          </p:cNvPr>
+          <p:cNvCxnSpPr>
+            <a:cxnSpLocks/>
+            <a:stCxn id="59" idx="2"/>
+            <a:endCxn id="63" idx="0"/>
+          </p:cNvCxnSpPr>
+          <p:nvPr/>
+        </p:nvCxnSpPr>
+        <p:spPr>
+          <a:xfrm rot="16200000" flipH="1">
+            <a:off x="3698411" y="3928085"/>
+            <a:ext cx="219703" cy="556401"/>
+          </a:xfrm>
+          <a:prstGeom prst="bentConnector3">
+            <a:avLst>
+              <a:gd name="adj1" fmla="val 50000"/>
+            </a:avLst>
+          </a:prstGeom>
+        </p:spPr>
+        <p:style>
+          <a:lnRef idx="2">
+            <a:schemeClr val="accent1"/>
+          </a:lnRef>
+          <a:fillRef idx="0">
+            <a:schemeClr val="accent1"/>
+          </a:fillRef>
+          <a:effectRef idx="1">
+            <a:schemeClr val="accent1"/>
+          </a:effectRef>
+          <a:fontRef idx="minor">
+            <a:schemeClr val="tx1"/>
+          </a:fontRef>
+        </p:style>
+      </p:cxnSp>
+      <p:sp>
+        <p:nvSpPr>
+          <p:cNvPr id="1043" name="직사각형 1042">
+            <a:extLst>
+              <a:ext uri="{FF2B5EF4-FFF2-40B4-BE49-F238E27FC236}">
+                <a16:creationId xmlns:a16="http://schemas.microsoft.com/office/drawing/2014/main" id="{11BEF97D-88AF-EEA9-C1B8-93C0D79DF3E2}"/>
+              </a:ext>
+            </a:extLst>
+          </p:cNvPr>
+          <p:cNvSpPr/>
+          <p:nvPr/>
+        </p:nvSpPr>
+        <p:spPr>
+          <a:xfrm>
+            <a:off x="3310047" y="1925650"/>
+            <a:ext cx="1503655" cy="1093027"/>
+          </a:xfrm>
+          <a:prstGeom prst="rect">
+            <a:avLst/>
+          </a:prstGeom>
+          <a:noFill/>
+          <a:ln>
+            <a:solidFill>
+              <a:srgbClr val="000000"/>
+            </a:solidFill>
+            <a:prstDash val="sysDash"/>
+          </a:ln>
+        </p:spPr>
+        <p:style>
+          <a:lnRef idx="2">
+            <a:schemeClr val="accent1">
+              <a:shade val="15000"/>
+            </a:schemeClr>
+          </a:lnRef>
+          <a:fillRef idx="1">
+            <a:schemeClr val="accent1"/>
+          </a:fillRef>
+          <a:effectRef idx="0">
+            <a:schemeClr val="accent1"/>
+          </a:effectRef>
+          <a:fontRef idx="minor">
+            <a:schemeClr val="lt1"/>
+          </a:fontRef>
+        </p:style>
+        <p:txBody>
+          <a:bodyPr rtlCol="0" anchor="ctr"/>
+          <a:lstStyle/>
+          <a:p>
+            <a:pPr algn="ctr"/>
+            <a:endParaRPr kumimoji="1" lang="ko-KR" altLang="en-US"/>
+          </a:p>
+        </p:txBody>
+      </p:sp>
+      <p:pic>
+        <p:nvPicPr>
+          <p:cNvPr id="15" name="그림 14">
+            <a:extLst>
+              <a:ext uri="{FF2B5EF4-FFF2-40B4-BE49-F238E27FC236}">
+                <a16:creationId xmlns:a16="http://schemas.microsoft.com/office/drawing/2014/main" id="{1ABC9D3B-CFA7-E166-CF7C-86924353DAE6}"/>
+              </a:ext>
+            </a:extLst>
+          </p:cNvPr>
+          <p:cNvPicPr>
+            <a:picLocks noChangeAspect="1"/>
+          </p:cNvPicPr>
+          <p:nvPr/>
+        </p:nvPicPr>
+        <p:blipFill>
+          <a:blip r:embed="rId16"/>
+          <a:stretch>
+            <a:fillRect/>
+          </a:stretch>
+        </p:blipFill>
+        <p:spPr>
+          <a:xfrm>
+            <a:off x="3855392" y="2832447"/>
+            <a:ext cx="462142" cy="462142"/>
+          </a:xfrm>
+          <a:prstGeom prst="rect">
+            <a:avLst/>
+          </a:prstGeom>
+        </p:spPr>
+      </p:pic>
+      <p:sp>
+        <p:nvSpPr>
+          <p:cNvPr id="1052" name="처리 1051">
+            <a:extLst>
+              <a:ext uri="{FF2B5EF4-FFF2-40B4-BE49-F238E27FC236}">
+                <a16:creationId xmlns:a16="http://schemas.microsoft.com/office/drawing/2014/main" id="{2B3FAD64-4705-E1C2-42FE-94B44868B7B4}"/>
+              </a:ext>
+            </a:extLst>
+          </p:cNvPr>
+          <p:cNvSpPr/>
+          <p:nvPr/>
+        </p:nvSpPr>
+        <p:spPr>
+          <a:xfrm>
+            <a:off x="3489354" y="2012763"/>
+            <a:ext cx="1203109" cy="243942"/>
+          </a:xfrm>
+          <a:prstGeom prst="flowChartProcess">
+            <a:avLst/>
+          </a:prstGeom>
+          <a:solidFill>
+            <a:schemeClr val="accent1"/>
+          </a:solidFill>
+          <a:ln>
+            <a:noFill/>
+          </a:ln>
+        </p:spPr>
+        <p:style>
+          <a:lnRef idx="2">
+            <a:schemeClr val="accent1">
+              <a:shade val="15000"/>
+            </a:schemeClr>
+          </a:lnRef>
+          <a:fillRef idx="1">
+            <a:schemeClr val="accent1"/>
+          </a:fillRef>
+          <a:effectRef idx="0">
+            <a:schemeClr val="accent1"/>
+          </a:effectRef>
+          <a:fontRef idx="minor">
+            <a:schemeClr val="lt1"/>
+          </a:fontRef>
+        </p:style>
+        <p:txBody>
+          <a:bodyPr rtlCol="0" anchor="ctr"/>
+          <a:lstStyle/>
+          <a:p>
+            <a:pPr algn="ctr"/>
+            <a:r>
+              <a:rPr kumimoji="1" lang="en-US" altLang="ko-KR" sz="1100" b="1" dirty="0" err="1">
+                <a:latin typeface="KoPubWorldDotum Bold" pitchFamily="2" charset="-127"/>
+                <a:ea typeface="KoPubWorldDotum Bold" pitchFamily="2" charset="-127"/>
+                <a:cs typeface="KoPubWorldDotum Bold" pitchFamily="2" charset="-127"/>
+              </a:rPr>
+              <a:t>Connect.py</a:t>
+            </a:r>
+            <a:endParaRPr kumimoji="1" lang="ko-KR" altLang="en-US" sz="1100" b="1" dirty="0">
+              <a:latin typeface="KoPubWorldDotum Bold" pitchFamily="2" charset="-127"/>
+              <a:ea typeface="KoPubWorldDotum Bold" pitchFamily="2" charset="-127"/>
+              <a:cs typeface="KoPubWorldDotum Bold" pitchFamily="2" charset="-127"/>
+            </a:endParaRPr>
+          </a:p>
+        </p:txBody>
+      </p:sp>
+      <p:sp>
+        <p:nvSpPr>
+          <p:cNvPr id="1053" name="처리 1052">
+            <a:extLst>
+              <a:ext uri="{FF2B5EF4-FFF2-40B4-BE49-F238E27FC236}">
+                <a16:creationId xmlns:a16="http://schemas.microsoft.com/office/drawing/2014/main" id="{A45DEA1D-9009-4C1F-77FF-51C1DCDF71ED}"/>
+              </a:ext>
+            </a:extLst>
+          </p:cNvPr>
+          <p:cNvSpPr/>
+          <p:nvPr/>
+        </p:nvSpPr>
+        <p:spPr>
+          <a:xfrm>
+            <a:off x="3489354" y="2272729"/>
+            <a:ext cx="1203109" cy="243942"/>
+          </a:xfrm>
+          <a:prstGeom prst="flowChartProcess">
+            <a:avLst/>
+          </a:prstGeom>
+          <a:solidFill>
+            <a:schemeClr val="accent1"/>
+          </a:solidFill>
+          <a:ln>
+            <a:noFill/>
+          </a:ln>
+        </p:spPr>
+        <p:style>
+          <a:lnRef idx="2">
+            <a:schemeClr val="accent1">
+              <a:shade val="15000"/>
+            </a:schemeClr>
+          </a:lnRef>
+          <a:fillRef idx="1">
+            <a:schemeClr val="accent1"/>
+          </a:fillRef>
+          <a:effectRef idx="0">
+            <a:schemeClr val="accent1"/>
+          </a:effectRef>
+          <a:fontRef idx="minor">
+            <a:schemeClr val="lt1"/>
+          </a:fontRef>
+        </p:style>
+        <p:txBody>
+          <a:bodyPr rtlCol="0" anchor="ctr"/>
+          <a:lstStyle/>
+          <a:p>
+            <a:pPr algn="ctr"/>
+            <a:r>
+              <a:rPr kumimoji="1" lang="en-US" altLang="ko-KR" sz="1100" b="1" dirty="0" err="1">
+                <a:latin typeface="KoPubWorldDotum Bold" pitchFamily="2" charset="-127"/>
+                <a:ea typeface="KoPubWorldDotum Bold" pitchFamily="2" charset="-127"/>
+                <a:cs typeface="KoPubWorldDotum Bold" pitchFamily="2" charset="-127"/>
+              </a:rPr>
+              <a:t>SendMsg.py</a:t>
+            </a:r>
+            <a:endParaRPr kumimoji="1" lang="ko-KR" altLang="en-US" sz="1100" b="1" dirty="0">
+              <a:latin typeface="KoPubWorldDotum Bold" pitchFamily="2" charset="-127"/>
+              <a:ea typeface="KoPubWorldDotum Bold" pitchFamily="2" charset="-127"/>
+              <a:cs typeface="KoPubWorldDotum Bold" pitchFamily="2" charset="-127"/>
+            </a:endParaRPr>
+          </a:p>
+        </p:txBody>
+      </p:sp>
+      <p:sp>
+        <p:nvSpPr>
+          <p:cNvPr id="1054" name="처리 1053">
+            <a:extLst>
+              <a:ext uri="{FF2B5EF4-FFF2-40B4-BE49-F238E27FC236}">
+                <a16:creationId xmlns:a16="http://schemas.microsoft.com/office/drawing/2014/main" id="{3D678DE6-EA83-F61A-84F9-F9C57880A466}"/>
+              </a:ext>
+            </a:extLst>
+          </p:cNvPr>
+          <p:cNvSpPr/>
+          <p:nvPr/>
+        </p:nvSpPr>
+        <p:spPr>
+          <a:xfrm>
+            <a:off x="3489354" y="2535557"/>
+            <a:ext cx="1203109" cy="243942"/>
+          </a:xfrm>
+          <a:prstGeom prst="flowChartProcess">
+            <a:avLst/>
+          </a:prstGeom>
+          <a:solidFill>
+            <a:schemeClr val="accent1"/>
+          </a:solidFill>
+          <a:ln>
+            <a:noFill/>
+          </a:ln>
+        </p:spPr>
+        <p:style>
+          <a:lnRef idx="2">
+            <a:schemeClr val="accent1">
+              <a:shade val="15000"/>
+            </a:schemeClr>
+          </a:lnRef>
+          <a:fillRef idx="1">
+            <a:schemeClr val="accent1"/>
+          </a:fillRef>
+          <a:effectRef idx="0">
+            <a:schemeClr val="accent1"/>
+          </a:effectRef>
+          <a:fontRef idx="minor">
+            <a:schemeClr val="lt1"/>
+          </a:fontRef>
+        </p:style>
+        <p:txBody>
+          <a:bodyPr rtlCol="0" anchor="ctr"/>
+          <a:lstStyle/>
+          <a:p>
+            <a:pPr algn="ctr"/>
+            <a:r>
+              <a:rPr kumimoji="1" lang="en-US" altLang="ko-KR" sz="1100" b="1" dirty="0" err="1">
+                <a:latin typeface="KoPubWorldDotum Bold" pitchFamily="2" charset="-127"/>
+                <a:ea typeface="KoPubWorldDotum Bold" pitchFamily="2" charset="-127"/>
+                <a:cs typeface="KoPubWorldDotum Bold" pitchFamily="2" charset="-127"/>
+              </a:rPr>
+              <a:t>Disconnect.py</a:t>
+            </a:r>
+            <a:endParaRPr kumimoji="1" lang="ko-KR" altLang="en-US" sz="1100" b="1" dirty="0">
+              <a:latin typeface="KoPubWorldDotum Bold" pitchFamily="2" charset="-127"/>
+              <a:ea typeface="KoPubWorldDotum Bold" pitchFamily="2" charset="-127"/>
+              <a:cs typeface="KoPubWorldDotum Bold" pitchFamily="2" charset="-127"/>
+            </a:endParaRPr>
+          </a:p>
+        </p:txBody>
+      </p:sp>
+      <p:cxnSp>
+        <p:nvCxnSpPr>
+          <p:cNvPr id="1067" name="직선 화살표 연결선 1066">
+            <a:extLst>
+              <a:ext uri="{FF2B5EF4-FFF2-40B4-BE49-F238E27FC236}">
+                <a16:creationId xmlns:a16="http://schemas.microsoft.com/office/drawing/2014/main" id="{149F7328-1BE8-17CB-C4C0-66F7647D7C50}"/>
+              </a:ext>
+            </a:extLst>
+          </p:cNvPr>
+          <p:cNvCxnSpPr>
+            <a:cxnSpLocks/>
+            <a:endCxn id="63" idx="0"/>
+          </p:cNvCxnSpPr>
+          <p:nvPr/>
+        </p:nvCxnSpPr>
+        <p:spPr>
+          <a:xfrm flipH="1">
+            <a:off x="4086463" y="3532729"/>
+            <a:ext cx="714" cy="783409"/>
+          </a:xfrm>
+          <a:prstGeom prst="straightConnector1">
+            <a:avLst/>
+          </a:prstGeom>
+          <a:ln>
+            <a:headEnd type="none" w="med" len="med"/>
+            <a:tailEnd type="none" w="med" len="med"/>
+          </a:ln>
+        </p:spPr>
+        <p:style>
+          <a:lnRef idx="2">
+            <a:schemeClr val="accent1"/>
+          </a:lnRef>
+          <a:fillRef idx="0">
+            <a:schemeClr val="accent1"/>
+          </a:fillRef>
+          <a:effectRef idx="1">
+            <a:schemeClr val="accent1"/>
+          </a:effectRef>
+          <a:fontRef idx="minor">
+            <a:schemeClr val="tx1"/>
+          </a:fontRef>
+        </p:style>
+      </p:cxnSp>
+      <p:cxnSp>
+        <p:nvCxnSpPr>
+          <p:cNvPr id="1076" name="꺾인 연결선[E] 1075">
+            <a:extLst>
+              <a:ext uri="{FF2B5EF4-FFF2-40B4-BE49-F238E27FC236}">
+                <a16:creationId xmlns:a16="http://schemas.microsoft.com/office/drawing/2014/main" id="{73C17EBA-AA90-6B46-7F01-57ADBE1AA852}"/>
+              </a:ext>
+            </a:extLst>
+          </p:cNvPr>
+          <p:cNvCxnSpPr>
+            <a:cxnSpLocks/>
+            <a:stCxn id="48" idx="2"/>
+            <a:endCxn id="63" idx="0"/>
+          </p:cNvCxnSpPr>
+          <p:nvPr/>
+        </p:nvCxnSpPr>
+        <p:spPr>
+          <a:xfrm rot="5400000">
+            <a:off x="4320841" y="2701871"/>
+            <a:ext cx="1379890" cy="1848645"/>
+          </a:xfrm>
+          <a:prstGeom prst="bentConnector3">
+            <a:avLst>
+              <a:gd name="adj1" fmla="val 92257"/>
+            </a:avLst>
+          </a:prstGeom>
+        </p:spPr>
+        <p:style>
+          <a:lnRef idx="2">
+            <a:schemeClr val="accent1"/>
+          </a:lnRef>
+          <a:fillRef idx="0">
+            <a:schemeClr val="accent1"/>
+          </a:fillRef>
+          <a:effectRef idx="1">
+            <a:schemeClr val="accent1"/>
+          </a:effectRef>
+          <a:fontRef idx="minor">
+            <a:schemeClr val="tx1"/>
+          </a:fontRef>
+        </p:style>
+      </p:cxnSp>
+      <p:cxnSp>
+        <p:nvCxnSpPr>
+          <p:cNvPr id="1085" name="직선 화살표 연결선 1084">
+            <a:extLst>
+              <a:ext uri="{FF2B5EF4-FFF2-40B4-BE49-F238E27FC236}">
+                <a16:creationId xmlns:a16="http://schemas.microsoft.com/office/drawing/2014/main" id="{AF66F51D-224D-29B7-1BE4-83AB8BF67959}"/>
+              </a:ext>
+            </a:extLst>
+          </p:cNvPr>
+          <p:cNvCxnSpPr>
+            <a:cxnSpLocks/>
+            <a:stCxn id="42" idx="1"/>
+            <a:endCxn id="33" idx="3"/>
+          </p:cNvCxnSpPr>
+          <p:nvPr/>
+        </p:nvCxnSpPr>
+        <p:spPr>
+          <a:xfrm flipH="1">
+            <a:off x="7016545" y="2378877"/>
+            <a:ext cx="485871" cy="3482"/>
+          </a:xfrm>
+          <a:prstGeom prst="straightConnector1">
+            <a:avLst/>
+          </a:prstGeom>
+          <a:ln>
+            <a:headEnd type="none" w="med" len="med"/>
+            <a:tailEnd type="none" w="med" len="med"/>
+          </a:ln>
+        </p:spPr>
+        <p:style>
+          <a:lnRef idx="2">
+            <a:schemeClr val="accent1"/>
+          </a:lnRef>
+          <a:fillRef idx="0">
+            <a:schemeClr val="accent1"/>
+          </a:fillRef>
+          <a:effectRef idx="1">
+            <a:schemeClr val="accent1"/>
+          </a:effectRef>
+          <a:fontRef idx="minor">
+            <a:schemeClr val="tx1"/>
+          </a:fontRef>
+        </p:style>
+      </p:cxnSp>
+      <p:cxnSp>
+        <p:nvCxnSpPr>
+          <p:cNvPr id="1089" name="직선 화살표 연결선 1088">
+            <a:extLst>
+              <a:ext uri="{FF2B5EF4-FFF2-40B4-BE49-F238E27FC236}">
+                <a16:creationId xmlns:a16="http://schemas.microsoft.com/office/drawing/2014/main" id="{E3317280-D50E-F500-87BA-9D60DB1CFD51}"/>
+              </a:ext>
+            </a:extLst>
+          </p:cNvPr>
+          <p:cNvCxnSpPr>
+            <a:cxnSpLocks/>
+            <a:stCxn id="39" idx="1"/>
+          </p:cNvCxnSpPr>
+          <p:nvPr/>
+        </p:nvCxnSpPr>
+        <p:spPr>
+          <a:xfrm flipH="1" flipV="1">
+            <a:off x="9678240" y="2365028"/>
+            <a:ext cx="383429" cy="374"/>
+          </a:xfrm>
+          <a:prstGeom prst="straightConnector1">
+            <a:avLst/>
+          </a:prstGeom>
+          <a:ln>
+            <a:headEnd type="none" w="med" len="med"/>
+            <a:tailEnd type="none" w="med" len="med"/>
+          </a:ln>
+        </p:spPr>
+        <p:style>
+          <a:lnRef idx="2">
+            <a:schemeClr val="accent1"/>
+          </a:lnRef>
+          <a:fillRef idx="0">
+            <a:schemeClr val="accent1"/>
+          </a:fillRef>
+          <a:effectRef idx="1">
+            <a:schemeClr val="accent1"/>
+          </a:effectRef>
+          <a:fontRef idx="minor">
+            <a:schemeClr val="tx1"/>
+          </a:fontRef>
+        </p:style>
+      </p:cxnSp>
+      <p:cxnSp>
+        <p:nvCxnSpPr>
+          <p:cNvPr id="1091" name="직선 화살표 연결선 1090">
+            <a:extLst>
+              <a:ext uri="{FF2B5EF4-FFF2-40B4-BE49-F238E27FC236}">
+                <a16:creationId xmlns:a16="http://schemas.microsoft.com/office/drawing/2014/main" id="{787BA1B1-27B4-01FB-69F3-A82B5E29B66D}"/>
+              </a:ext>
+            </a:extLst>
+          </p:cNvPr>
+          <p:cNvCxnSpPr>
+            <a:cxnSpLocks/>
+          </p:cNvCxnSpPr>
+          <p:nvPr/>
+        </p:nvCxnSpPr>
+        <p:spPr>
+          <a:xfrm flipH="1">
+            <a:off x="8705525" y="2365028"/>
+            <a:ext cx="503315" cy="0"/>
+          </a:xfrm>
+          <a:prstGeom prst="straightConnector1">
+            <a:avLst/>
+          </a:prstGeom>
+          <a:ln>
+            <a:headEnd type="none" w="med" len="med"/>
+            <a:tailEnd type="none" w="med" len="med"/>
+          </a:ln>
+        </p:spPr>
+        <p:style>
+          <a:lnRef idx="2">
+            <a:schemeClr val="accent1"/>
+          </a:lnRef>
+          <a:fillRef idx="0">
+            <a:schemeClr val="accent1"/>
+          </a:fillRef>
+          <a:effectRef idx="1">
+            <a:schemeClr val="accent1"/>
+          </a:effectRef>
+          <a:fontRef idx="minor">
+            <a:schemeClr val="tx1"/>
+          </a:fontRef>
+        </p:style>
+      </p:cxnSp>
+      <p:cxnSp>
+        <p:nvCxnSpPr>
+          <p:cNvPr id="1094" name="꺾인 연결선[E] 1093">
+            <a:extLst>
+              <a:ext uri="{FF2B5EF4-FFF2-40B4-BE49-F238E27FC236}">
+                <a16:creationId xmlns:a16="http://schemas.microsoft.com/office/drawing/2014/main" id="{0A5DBA0D-A5B1-C13C-EDAC-C43E544412B2}"/>
+              </a:ext>
+            </a:extLst>
+          </p:cNvPr>
+          <p:cNvCxnSpPr>
+            <a:stCxn id="1052" idx="3"/>
+            <a:endCxn id="24" idx="1"/>
+          </p:cNvCxnSpPr>
+          <p:nvPr/>
+        </p:nvCxnSpPr>
+        <p:spPr>
+          <a:xfrm>
+            <a:off x="4692463" y="2134734"/>
+            <a:ext cx="1002785" cy="255166"/>
+          </a:xfrm>
+          <a:prstGeom prst="bentConnector3">
+            <a:avLst/>
+          </a:prstGeom>
+        </p:spPr>
+        <p:style>
+          <a:lnRef idx="2">
+            <a:schemeClr val="accent1"/>
+          </a:lnRef>
+          <a:fillRef idx="0">
+            <a:schemeClr val="accent1"/>
+          </a:fillRef>
+          <a:effectRef idx="1">
+            <a:schemeClr val="accent1"/>
+          </a:effectRef>
+          <a:fontRef idx="minor">
+            <a:schemeClr val="tx1"/>
+          </a:fontRef>
+        </p:style>
+      </p:cxnSp>
+      <p:cxnSp>
+        <p:nvCxnSpPr>
+          <p:cNvPr id="1095" name="꺾인 연결선[E] 1094">
+            <a:extLst>
+              <a:ext uri="{FF2B5EF4-FFF2-40B4-BE49-F238E27FC236}">
+                <a16:creationId xmlns:a16="http://schemas.microsoft.com/office/drawing/2014/main" id="{0DB99011-CA49-1831-AFB3-195A8C27A847}"/>
+              </a:ext>
+            </a:extLst>
+          </p:cNvPr>
+          <p:cNvCxnSpPr>
+            <a:cxnSpLocks/>
+            <a:stCxn id="1054" idx="3"/>
+            <a:endCxn id="24" idx="1"/>
+          </p:cNvCxnSpPr>
+          <p:nvPr/>
+        </p:nvCxnSpPr>
+        <p:spPr>
+          <a:xfrm flipV="1">
+            <a:off x="4692463" y="2389900"/>
+            <a:ext cx="1002785" cy="267628"/>
+          </a:xfrm>
+          <a:prstGeom prst="bentConnector3">
+            <a:avLst/>
+          </a:prstGeom>
+        </p:spPr>
+        <p:style>
+          <a:lnRef idx="2">
+            <a:schemeClr val="accent1"/>
+          </a:lnRef>
+          <a:fillRef idx="0">
+            <a:schemeClr val="accent1"/>
+          </a:fillRef>
+          <a:effectRef idx="1">
+            <a:schemeClr val="accent1"/>
+          </a:effectRef>
+          <a:fontRef idx="minor">
+            <a:schemeClr val="tx1"/>
+          </a:fontRef>
+        </p:style>
+      </p:cxnSp>
+      <p:cxnSp>
+        <p:nvCxnSpPr>
+          <p:cNvPr id="1104" name="직선 화살표 연결선 1103">
+            <a:extLst>
+              <a:ext uri="{FF2B5EF4-FFF2-40B4-BE49-F238E27FC236}">
+                <a16:creationId xmlns:a16="http://schemas.microsoft.com/office/drawing/2014/main" id="{AF93BA9D-DDEB-009B-EE22-DFB399A1209E}"/>
+              </a:ext>
+            </a:extLst>
+          </p:cNvPr>
+          <p:cNvCxnSpPr>
+            <a:cxnSpLocks/>
+            <a:endCxn id="33" idx="1"/>
+          </p:cNvCxnSpPr>
+          <p:nvPr/>
+        </p:nvCxnSpPr>
+        <p:spPr>
+          <a:xfrm>
+            <a:off x="6156574" y="2382359"/>
+            <a:ext cx="424855" cy="0"/>
+          </a:xfrm>
+          <a:prstGeom prst="straightConnector1">
+            <a:avLst/>
+          </a:prstGeom>
+          <a:ln>
+            <a:headEnd type="none" w="med" len="med"/>
+            <a:tailEnd type="none" w="med" len="med"/>
+          </a:ln>
+        </p:spPr>
+        <p:style>
+          <a:lnRef idx="2">
+            <a:schemeClr val="accent1"/>
+          </a:lnRef>
+          <a:fillRef idx="0">
+            <a:schemeClr val="accent1"/>
+          </a:fillRef>
+          <a:effectRef idx="1">
+            <a:schemeClr val="accent1"/>
+          </a:effectRef>
+          <a:fontRef idx="minor">
+            <a:schemeClr val="tx1"/>
+          </a:fontRef>
+        </p:style>
+      </p:cxnSp>
+      <p:sp>
+        <p:nvSpPr>
+          <p:cNvPr id="1111" name="TextBox 1110">
+            <a:extLst>
+              <a:ext uri="{FF2B5EF4-FFF2-40B4-BE49-F238E27FC236}">
+                <a16:creationId xmlns:a16="http://schemas.microsoft.com/office/drawing/2014/main" id="{24E2424D-2674-8BB2-D718-1DE1A6F03764}"/>
+              </a:ext>
+            </a:extLst>
+          </p:cNvPr>
+          <p:cNvSpPr txBox="1"/>
+          <p:nvPr/>
+        </p:nvSpPr>
+        <p:spPr>
+          <a:xfrm>
+            <a:off x="1683026" y="1305339"/>
+            <a:ext cx="184731" cy="369332"/>
+          </a:xfrm>
+          <a:prstGeom prst="rect">
+            <a:avLst/>
+          </a:prstGeom>
+          <a:noFill/>
+        </p:spPr>
+        <p:txBody>
+          <a:bodyPr wrap="none" rtlCol="0">
+            <a:spAutoFit/>
+          </a:bodyPr>
+          <a:lstStyle/>
+          <a:p>
+            <a:endParaRPr kumimoji="1" lang="ko-KR" altLang="en-US"/>
+          </a:p>
+        </p:txBody>
+      </p:sp>
+    </p:spTree>
+    <p:extLst>
+      <p:ext uri="{BB962C8B-B14F-4D97-AF65-F5344CB8AC3E}">
+        <p14:creationId xmlns:p14="http://schemas.microsoft.com/office/powerpoint/2010/main" val="3959940862"/>
+      </p:ext>
+    </p:extLst>
+  </p:cSld>
+  <p:clrMapOvr>
+    <a:masterClrMapping/>
+  </p:clrMapOvr>
+</p:sld>
+</file>
+
 <file path=ppt/theme/theme1.xml><?xml version="1.0" encoding="utf-8"?>
 <a:theme xmlns:a="http://schemas.openxmlformats.org/drawingml/2006/main" name="Office 테마">
   <a:themeElements>
@@ -12886,4 +16037,319 @@
     </a:ext>
   </a:extLst>
 </a:theme>
+</file>
+
+<file path=ppt/theme/theme2.xml><?xml version="1.0" encoding="utf-8"?>
+<a:theme xmlns:a="http://schemas.openxmlformats.org/drawingml/2006/main" name="Office 테마">
+  <a:themeElements>
+    <a:clrScheme name="Office">
+      <a:dk1>
+        <a:sysClr val="windowText" lastClr="000000"/>
+      </a:dk1>
+      <a:lt1>
+        <a:sysClr val="window" lastClr="FFFFFF"/>
+      </a:lt1>
+      <a:dk2>
+        <a:srgbClr val="0E2841"/>
+      </a:dk2>
+      <a:lt2>
+        <a:srgbClr val="E8E8E8"/>
+      </a:lt2>
+      <a:accent1>
+        <a:srgbClr val="156082"/>
+      </a:accent1>
+      <a:accent2>
+        <a:srgbClr val="E97132"/>
+      </a:accent2>
+      <a:accent3>
+        <a:srgbClr val="196B24"/>
+      </a:accent3>
+      <a:accent4>
+        <a:srgbClr val="0F9ED5"/>
+      </a:accent4>
+      <a:accent5>
+        <a:srgbClr val="A02B93"/>
+      </a:accent5>
+      <a:accent6>
+        <a:srgbClr val="4EA72E"/>
+      </a:accent6>
+      <a:hlink>
+        <a:srgbClr val="467886"/>
+      </a:hlink>
+      <a:folHlink>
+        <a:srgbClr val="96607D"/>
+      </a:folHlink>
+    </a:clrScheme>
+    <a:fontScheme name="Office">
+      <a:majorFont>
+        <a:latin typeface="맑은 고딕" panose="02110004020202020204"/>
+        <a:ea typeface=""/>
+        <a:cs typeface=""/>
+        <a:font script="Jpan" typeface="游ゴシック Light"/>
+        <a:font script="Hang" typeface="맑은 고딕"/>
+        <a:font script="Hans" typeface="等线 Light"/>
+        <a:font script="Hant" typeface="新細明體"/>
+        <a:font script="Arab" typeface="Times New Roman"/>
+        <a:font script="Hebr" typeface="Times New Roman"/>
+        <a:font script="Thai" typeface="Angsana New"/>
+        <a:font script="Ethi" typeface="Nyala"/>
+        <a:font script="Beng" typeface="Vrinda"/>
+        <a:font script="Gujr" typeface="Shruti"/>
+        <a:font script="Khmr" typeface="MoolBoran"/>
+        <a:font script="Knda" typeface="Tunga"/>
+        <a:font script="Guru" typeface="Raavi"/>
+        <a:font script="Cans" typeface="Euphemia"/>
+        <a:font script="Cher" typeface="Plantagenet Cherokee"/>
+        <a:font script="Yiii" typeface="Microsoft Yi Baiti"/>
+        <a:font script="Tibt" typeface="Microsoft Himalaya"/>
+        <a:font script="Thaa" typeface="MV Boli"/>
+        <a:font script="Deva" typeface="Mangal"/>
+        <a:font script="Telu" typeface="Gautami"/>
+        <a:font script="Taml" typeface="Latha"/>
+        <a:font script="Syrc" typeface="Estrangelo Edessa"/>
+        <a:font script="Orya" typeface="Kalinga"/>
+        <a:font script="Mlym" typeface="Kartika"/>
+        <a:font script="Laoo" typeface="DokChampa"/>
+        <a:font script="Sinh" typeface="Iskoola Pota"/>
+        <a:font script="Mong" typeface="Mongolian Baiti"/>
+        <a:font script="Viet" typeface="Times New Roman"/>
+        <a:font script="Uigh" typeface="Microsoft Uighur"/>
+        <a:font script="Geor" typeface="Sylfaen"/>
+        <a:font script="Armn" typeface="Arial"/>
+        <a:font script="Bugi" typeface="Leelawadee UI"/>
+        <a:font script="Bopo" typeface="Microsoft JhengHei"/>
+        <a:font script="Java" typeface="Javanese Text"/>
+        <a:font script="Lisu" typeface="Segoe UI"/>
+        <a:font script="Mymr" typeface="Myanmar Text"/>
+        <a:font script="Nkoo" typeface="Ebrima"/>
+        <a:font script="Olck" typeface="Nirmala UI"/>
+        <a:font script="Osma" typeface="Ebrima"/>
+        <a:font script="Phag" typeface="Phagspa"/>
+        <a:font script="Syrn" typeface="Estrangelo Edessa"/>
+        <a:font script="Syrj" typeface="Estrangelo Edessa"/>
+        <a:font script="Syre" typeface="Estrangelo Edessa"/>
+        <a:font script="Sora" typeface="Nirmala UI"/>
+        <a:font script="Tale" typeface="Microsoft Tai Le"/>
+        <a:font script="Talu" typeface="Microsoft New Tai Lue"/>
+        <a:font script="Tfng" typeface="Ebrima"/>
+      </a:majorFont>
+      <a:minorFont>
+        <a:latin typeface="맑은 고딕" panose="02110004020202020204"/>
+        <a:ea typeface=""/>
+        <a:cs typeface=""/>
+        <a:font script="Jpan" typeface="游ゴシック"/>
+        <a:font script="Hang" typeface="맑은 고딕"/>
+        <a:font script="Hans" typeface="等线"/>
+        <a:font script="Hant" typeface="新細明體"/>
+        <a:font script="Arab" typeface="Arial"/>
+        <a:font script="Hebr" typeface="Arial"/>
+        <a:font script="Thai" typeface="Cordia New"/>
+        <a:font script="Ethi" typeface="Nyala"/>
+        <a:font script="Beng" typeface="Vrinda"/>
+        <a:font script="Gujr" typeface="Shruti"/>
+        <a:font script="Khmr" typeface="DaunPenh"/>
+        <a:font script="Knda" typeface="Tunga"/>
+        <a:font script="Guru" typeface="Raavi"/>
+        <a:font script="Cans" typeface="Euphemia"/>
+        <a:font script="Cher" typeface="Plantagenet Cherokee"/>
+        <a:font script="Yiii" typeface="Microsoft Yi Baiti"/>
+        <a:font script="Tibt" typeface="Microsoft Himalaya"/>
+        <a:font script="Thaa" typeface="MV Boli"/>
+        <a:font script="Deva" typeface="Mangal"/>
+        <a:font script="Telu" typeface="Gautami"/>
+        <a:font script="Taml" typeface="Latha"/>
+        <a:font script="Syrc" typeface="Estrangelo Edessa"/>
+        <a:font script="Orya" typeface="Kalinga"/>
+        <a:font script="Mlym" typeface="Kartika"/>
+        <a:font script="Laoo" typeface="DokChampa"/>
+        <a:font script="Sinh" typeface="Iskoola Pota"/>
+        <a:font script="Mong" typeface="Mongolian Baiti"/>
+        <a:font script="Viet" typeface="Arial"/>
+        <a:font script="Uigh" typeface="Microsoft Uighur"/>
+        <a:font script="Geor" typeface="Sylfaen"/>
+        <a:font script="Armn" typeface="Arial"/>
+        <a:font script="Bugi" typeface="Leelawadee UI"/>
+        <a:font script="Bopo" typeface="Microsoft JhengHei"/>
+        <a:font script="Java" typeface="Javanese Text"/>
+        <a:font script="Lisu" typeface="Segoe UI"/>
+        <a:font script="Mymr" typeface="Myanmar Text"/>
+        <a:font script="Nkoo" typeface="Ebrima"/>
+        <a:font script="Olck" typeface="Nirmala UI"/>
+        <a:font script="Osma" typeface="Ebrima"/>
+        <a:font script="Phag" typeface="Phagspa"/>
+        <a:font script="Syrn" typeface="Estrangelo Edessa"/>
+        <a:font script="Syrj" typeface="Estrangelo Edessa"/>
+        <a:font script="Syre" typeface="Estrangelo Edessa"/>
+        <a:font script="Sora" typeface="Nirmala UI"/>
+        <a:font script="Tale" typeface="Microsoft Tai Le"/>
+        <a:font script="Talu" typeface="Microsoft New Tai Lue"/>
+        <a:font script="Tfng" typeface="Ebrima"/>
+      </a:minorFont>
+    </a:fontScheme>
+    <a:fmtScheme name="Office">
+      <a:fillStyleLst>
+        <a:solidFill>
+          <a:schemeClr val="phClr"/>
+        </a:solidFill>
+        <a:gradFill rotWithShape="1">
+          <a:gsLst>
+            <a:gs pos="0">
+              <a:schemeClr val="phClr">
+                <a:lumMod val="110000"/>
+                <a:satMod val="105000"/>
+                <a:tint val="67000"/>
+              </a:schemeClr>
+            </a:gs>
+            <a:gs pos="50000">
+              <a:schemeClr val="phClr">
+                <a:lumMod val="105000"/>
+                <a:satMod val="103000"/>
+                <a:tint val="73000"/>
+              </a:schemeClr>
+            </a:gs>
+            <a:gs pos="100000">
+              <a:schemeClr val="phClr">
+                <a:lumMod val="105000"/>
+                <a:satMod val="109000"/>
+                <a:tint val="81000"/>
+              </a:schemeClr>
+            </a:gs>
+          </a:gsLst>
+          <a:lin ang="5400000" scaled="0"/>
+        </a:gradFill>
+        <a:gradFill rotWithShape="1">
+          <a:gsLst>
+            <a:gs pos="0">
+              <a:schemeClr val="phClr">
+                <a:satMod val="103000"/>
+                <a:lumMod val="102000"/>
+                <a:tint val="94000"/>
+              </a:schemeClr>
+            </a:gs>
+            <a:gs pos="50000">
+              <a:schemeClr val="phClr">
+                <a:satMod val="110000"/>
+                <a:lumMod val="100000"/>
+                <a:shade val="100000"/>
+              </a:schemeClr>
+            </a:gs>
+            <a:gs pos="100000">
+              <a:schemeClr val="phClr">
+                <a:lumMod val="99000"/>
+                <a:satMod val="120000"/>
+                <a:shade val="78000"/>
+              </a:schemeClr>
+            </a:gs>
+          </a:gsLst>
+          <a:lin ang="5400000" scaled="0"/>
+        </a:gradFill>
+      </a:fillStyleLst>
+      <a:lnStyleLst>
+        <a:ln w="12700" cap="flat" cmpd="sng" algn="ctr">
+          <a:solidFill>
+            <a:schemeClr val="phClr"/>
+          </a:solidFill>
+          <a:prstDash val="solid"/>
+          <a:miter lim="800000"/>
+        </a:ln>
+        <a:ln w="19050" cap="flat" cmpd="sng" algn="ctr">
+          <a:solidFill>
+            <a:schemeClr val="phClr"/>
+          </a:solidFill>
+          <a:prstDash val="solid"/>
+          <a:miter lim="800000"/>
+        </a:ln>
+        <a:ln w="25400" cap="flat" cmpd="sng" algn="ctr">
+          <a:solidFill>
+            <a:schemeClr val="phClr"/>
+          </a:solidFill>
+          <a:prstDash val="solid"/>
+          <a:miter lim="800000"/>
+        </a:ln>
+      </a:lnStyleLst>
+      <a:effectStyleLst>
+        <a:effectStyle>
+          <a:effectLst/>
+        </a:effectStyle>
+        <a:effectStyle>
+          <a:effectLst/>
+        </a:effectStyle>
+        <a:effectStyle>
+          <a:effectLst>
+            <a:outerShdw blurRad="57150" dist="19050" dir="5400000" algn="ctr" rotWithShape="0">
+              <a:srgbClr val="000000">
+                <a:alpha val="63000"/>
+              </a:srgbClr>
+            </a:outerShdw>
+          </a:effectLst>
+        </a:effectStyle>
+      </a:effectStyleLst>
+      <a:bgFillStyleLst>
+        <a:solidFill>
+          <a:schemeClr val="phClr"/>
+        </a:solidFill>
+        <a:solidFill>
+          <a:schemeClr val="phClr">
+            <a:tint val="95000"/>
+            <a:satMod val="170000"/>
+          </a:schemeClr>
+        </a:solidFill>
+        <a:gradFill rotWithShape="1">
+          <a:gsLst>
+            <a:gs pos="0">
+              <a:schemeClr val="phClr">
+                <a:tint val="93000"/>
+                <a:satMod val="150000"/>
+                <a:shade val="98000"/>
+                <a:lumMod val="102000"/>
+              </a:schemeClr>
+            </a:gs>
+            <a:gs pos="50000">
+              <a:schemeClr val="phClr">
+                <a:tint val="98000"/>
+                <a:satMod val="130000"/>
+                <a:shade val="90000"/>
+                <a:lumMod val="103000"/>
+              </a:schemeClr>
+            </a:gs>
+            <a:gs pos="100000">
+              <a:schemeClr val="phClr">
+                <a:shade val="63000"/>
+                <a:satMod val="120000"/>
+              </a:schemeClr>
+            </a:gs>
+          </a:gsLst>
+          <a:lin ang="5400000" scaled="0"/>
+        </a:gradFill>
+      </a:bgFillStyleLst>
+    </a:fmtScheme>
+  </a:themeElements>
+  <a:objectDefaults>
+    <a:lnDef>
+      <a:spPr/>
+      <a:bodyPr/>
+      <a:lstStyle/>
+      <a:style>
+        <a:lnRef idx="2">
+          <a:schemeClr val="accent1"/>
+        </a:lnRef>
+        <a:fillRef idx="0">
+          <a:schemeClr val="accent1"/>
+        </a:fillRef>
+        <a:effectRef idx="1">
+          <a:schemeClr val="accent1"/>
+        </a:effectRef>
+        <a:fontRef idx="minor">
+          <a:schemeClr val="tx1"/>
+        </a:fontRef>
+      </a:style>
+    </a:lnDef>
+  </a:objectDefaults>
+  <a:extraClrSchemeLst/>
+  <a:extLst>
+    <a:ext uri="{05A4C25C-085E-4340-85A3-A5531E510DB2}">
+      <thm15:themeFamily xmlns:thm15="http://schemas.microsoft.com/office/thememl/2012/main" name="Office Theme" id="{2E142A2C-CD16-42D6-873A-C26D2A0506FA}" vid="{1BDDFF52-6CD6-40A5-AB3C-68EB2F1E4D0A}"/>
+    </a:ext>
+  </a:extLst>
+</a:theme>
 </file>
</xml_diff>